<commit_message>
for meeting 6 submission
</commit_message>
<xml_diff>
--- a/Stargazer.pptx
+++ b/Stargazer.pptx
@@ -5,7 +5,7 @@
     <p:sldMasterId id="2147483684" r:id="rId1"/>
   </p:sldMasterIdLst>
   <p:notesMasterIdLst>
-    <p:notesMasterId r:id="rId27"/>
+    <p:notesMasterId r:id="rId29"/>
   </p:notesMasterIdLst>
   <p:sldIdLst>
     <p:sldId id="256" r:id="rId2"/>
@@ -13,26 +13,28 @@
     <p:sldId id="260" r:id="rId4"/>
     <p:sldId id="282" r:id="rId5"/>
     <p:sldId id="259" r:id="rId6"/>
-    <p:sldId id="258" r:id="rId7"/>
-    <p:sldId id="262" r:id="rId8"/>
-    <p:sldId id="284" r:id="rId9"/>
-    <p:sldId id="286" r:id="rId10"/>
-    <p:sldId id="285" r:id="rId11"/>
-    <p:sldId id="279" r:id="rId12"/>
-    <p:sldId id="261" r:id="rId13"/>
-    <p:sldId id="265" r:id="rId14"/>
-    <p:sldId id="288" r:id="rId15"/>
-    <p:sldId id="266" r:id="rId16"/>
-    <p:sldId id="268" r:id="rId17"/>
-    <p:sldId id="269" r:id="rId18"/>
-    <p:sldId id="270" r:id="rId19"/>
-    <p:sldId id="280" r:id="rId20"/>
-    <p:sldId id="281" r:id="rId21"/>
-    <p:sldId id="272" r:id="rId22"/>
-    <p:sldId id="283" r:id="rId23"/>
-    <p:sldId id="278" r:id="rId24"/>
-    <p:sldId id="273" r:id="rId25"/>
-    <p:sldId id="276" r:id="rId26"/>
+    <p:sldId id="291" r:id="rId7"/>
+    <p:sldId id="292" r:id="rId8"/>
+    <p:sldId id="289" r:id="rId9"/>
+    <p:sldId id="293" r:id="rId10"/>
+    <p:sldId id="294" r:id="rId11"/>
+    <p:sldId id="286" r:id="rId12"/>
+    <p:sldId id="285" r:id="rId13"/>
+    <p:sldId id="279" r:id="rId14"/>
+    <p:sldId id="261" r:id="rId15"/>
+    <p:sldId id="265" r:id="rId16"/>
+    <p:sldId id="288" r:id="rId17"/>
+    <p:sldId id="295" r:id="rId18"/>
+    <p:sldId id="266" r:id="rId19"/>
+    <p:sldId id="268" r:id="rId20"/>
+    <p:sldId id="269" r:id="rId21"/>
+    <p:sldId id="280" r:id="rId22"/>
+    <p:sldId id="281" r:id="rId23"/>
+    <p:sldId id="272" r:id="rId24"/>
+    <p:sldId id="283" r:id="rId25"/>
+    <p:sldId id="278" r:id="rId26"/>
+    <p:sldId id="273" r:id="rId27"/>
+    <p:sldId id="276" r:id="rId28"/>
   </p:sldIdLst>
   <p:sldSz cx="9144000" cy="6858000" type="screen4x3"/>
   <p:notesSz cx="6858000" cy="9144000"/>
@@ -217,7 +219,7 @@
             <a:fld id="{2AAFEF68-1DE9-47A7-9FE3-8BA9D24E7EE3}" type="datetimeFigureOut">
               <a:rPr lang="en-US" smtClean="0"/>
               <a:pPr/>
-              <a:t>12/1/2009</a:t>
+              <a:t>12/2/2009</a:t>
             </a:fld>
             <a:endParaRPr lang="en-CA"/>
           </a:p>
@@ -665,6 +667,350 @@
 </p:notes>
 </file>
 
+<file path=ppt/notesSlides/notesSlide10.xml><?xml version="1.0" encoding="utf-8"?>
+<p:notes xmlns:a="http://schemas.openxmlformats.org/drawingml/2006/main" xmlns:r="http://schemas.openxmlformats.org/officeDocument/2006/relationships" xmlns:p="http://schemas.openxmlformats.org/presentationml/2006/main">
+  <p:cSld>
+    <p:spTree>
+      <p:nvGrpSpPr>
+        <p:cNvPr id="1" name=""/>
+        <p:cNvGrpSpPr/>
+        <p:nvPr/>
+      </p:nvGrpSpPr>
+      <p:grpSpPr>
+        <a:xfrm>
+          <a:off x="0" y="0"/>
+          <a:ext cx="0" cy="0"/>
+          <a:chOff x="0" y="0"/>
+          <a:chExt cx="0" cy="0"/>
+        </a:xfrm>
+      </p:grpSpPr>
+      <p:sp>
+        <p:nvSpPr>
+          <p:cNvPr id="2" name="Slide Image Placeholder 1"/>
+          <p:cNvSpPr>
+            <a:spLocks noGrp="1" noRot="1" noChangeAspect="1"/>
+          </p:cNvSpPr>
+          <p:nvPr>
+            <p:ph type="sldImg"/>
+          </p:nvPr>
+        </p:nvSpPr>
+        <p:spPr/>
+      </p:sp>
+      <p:sp>
+        <p:nvSpPr>
+          <p:cNvPr id="3" name="Notes Placeholder 2"/>
+          <p:cNvSpPr>
+            <a:spLocks noGrp="1"/>
+          </p:cNvSpPr>
+          <p:nvPr>
+            <p:ph type="body" idx="1"/>
+          </p:nvPr>
+        </p:nvSpPr>
+        <p:spPr/>
+        <p:txBody>
+          <a:bodyPr>
+            <a:normAutofit/>
+          </a:bodyPr>
+          <a:lstStyle/>
+          <a:p>
+            <a:r>
+              <a:rPr lang="en-US" dirty="0" smtClean="0"/>
+              <a:t>To </a:t>
+            </a:r>
+            <a:r>
+              <a:rPr lang="en-US" smtClean="0"/>
+              <a:t>be added</a:t>
+            </a:r>
+            <a:endParaRPr lang="en-US" dirty="0"/>
+          </a:p>
+        </p:txBody>
+      </p:sp>
+      <p:sp>
+        <p:nvSpPr>
+          <p:cNvPr id="4" name="Slide Number Placeholder 3"/>
+          <p:cNvSpPr>
+            <a:spLocks noGrp="1"/>
+          </p:cNvSpPr>
+          <p:nvPr>
+            <p:ph type="sldNum" sz="quarter" idx="10"/>
+          </p:nvPr>
+        </p:nvSpPr>
+        <p:spPr/>
+        <p:txBody>
+          <a:bodyPr/>
+          <a:lstStyle/>
+          <a:p>
+            <a:fld id="{64EF572D-EF5B-479C-89C5-F647D7191839}" type="slidenum">
+              <a:rPr lang="en-CA" smtClean="0"/>
+              <a:pPr/>
+              <a:t>17</a:t>
+            </a:fld>
+            <a:endParaRPr lang="en-CA"/>
+          </a:p>
+        </p:txBody>
+      </p:sp>
+    </p:spTree>
+  </p:cSld>
+  <p:clrMapOvr>
+    <a:masterClrMapping/>
+  </p:clrMapOvr>
+</p:notes>
+</file>
+
+<file path=ppt/notesSlides/notesSlide11.xml><?xml version="1.0" encoding="utf-8"?>
+<p:notes xmlns:a="http://schemas.openxmlformats.org/drawingml/2006/main" xmlns:r="http://schemas.openxmlformats.org/officeDocument/2006/relationships" xmlns:p="http://schemas.openxmlformats.org/presentationml/2006/main">
+  <p:cSld>
+    <p:spTree>
+      <p:nvGrpSpPr>
+        <p:cNvPr id="1" name=""/>
+        <p:cNvGrpSpPr/>
+        <p:nvPr/>
+      </p:nvGrpSpPr>
+      <p:grpSpPr>
+        <a:xfrm>
+          <a:off x="0" y="0"/>
+          <a:ext cx="0" cy="0"/>
+          <a:chOff x="0" y="0"/>
+          <a:chExt cx="0" cy="0"/>
+        </a:xfrm>
+      </p:grpSpPr>
+      <p:sp>
+        <p:nvSpPr>
+          <p:cNvPr id="2" name="Slide Image Placeholder 1"/>
+          <p:cNvSpPr>
+            <a:spLocks noGrp="1" noRot="1" noChangeAspect="1"/>
+          </p:cNvSpPr>
+          <p:nvPr>
+            <p:ph type="sldImg"/>
+          </p:nvPr>
+        </p:nvSpPr>
+        <p:spPr/>
+      </p:sp>
+      <p:sp>
+        <p:nvSpPr>
+          <p:cNvPr id="3" name="Notes Placeholder 2"/>
+          <p:cNvSpPr>
+            <a:spLocks noGrp="1"/>
+          </p:cNvSpPr>
+          <p:nvPr>
+            <p:ph type="body" idx="1"/>
+          </p:nvPr>
+        </p:nvSpPr>
+        <p:spPr/>
+        <p:txBody>
+          <a:bodyPr>
+            <a:normAutofit/>
+          </a:bodyPr>
+          <a:lstStyle/>
+          <a:p>
+            <a:r>
+              <a:rPr lang="en-US" sz="1200" kern="1200" dirty="0" smtClean="0">
+                <a:solidFill>
+                  <a:schemeClr val="tx1"/>
+                </a:solidFill>
+                <a:latin typeface="+mn-lt"/>
+                <a:ea typeface="+mn-ea"/>
+                <a:cs typeface="+mn-cs"/>
+              </a:rPr>
+              <a:t>Probabilities can be: low, moderate, high.</a:t>
+            </a:r>
+          </a:p>
+          <a:p>
+            <a:r>
+              <a:rPr lang="en-US" sz="1200" kern="1200" smtClean="0">
+                <a:solidFill>
+                  <a:schemeClr val="tx1"/>
+                </a:solidFill>
+                <a:latin typeface="+mn-lt"/>
+                <a:ea typeface="+mn-ea"/>
+                <a:cs typeface="+mn-cs"/>
+              </a:rPr>
+              <a:t>Effects can be: tolerable, serious and catastrophic</a:t>
+            </a:r>
+            <a:endParaRPr lang="en-US"/>
+          </a:p>
+        </p:txBody>
+      </p:sp>
+      <p:sp>
+        <p:nvSpPr>
+          <p:cNvPr id="4" name="Slide Number Placeholder 3"/>
+          <p:cNvSpPr>
+            <a:spLocks noGrp="1"/>
+          </p:cNvSpPr>
+          <p:nvPr>
+            <p:ph type="sldNum" sz="quarter" idx="10"/>
+          </p:nvPr>
+        </p:nvSpPr>
+        <p:spPr/>
+        <p:txBody>
+          <a:bodyPr/>
+          <a:lstStyle/>
+          <a:p>
+            <a:fld id="{64EF572D-EF5B-479C-89C5-F647D7191839}" type="slidenum">
+              <a:rPr lang="en-CA" smtClean="0"/>
+              <a:pPr/>
+              <a:t>22</a:t>
+            </a:fld>
+            <a:endParaRPr lang="en-CA"/>
+          </a:p>
+        </p:txBody>
+      </p:sp>
+    </p:spTree>
+  </p:cSld>
+  <p:clrMapOvr>
+    <a:masterClrMapping/>
+  </p:clrMapOvr>
+</p:notes>
+</file>
+
+<file path=ppt/notesSlides/notesSlide12.xml><?xml version="1.0" encoding="utf-8"?>
+<p:notes xmlns:a="http://schemas.openxmlformats.org/drawingml/2006/main" xmlns:r="http://schemas.openxmlformats.org/officeDocument/2006/relationships" xmlns:p="http://schemas.openxmlformats.org/presentationml/2006/main">
+  <p:cSld>
+    <p:spTree>
+      <p:nvGrpSpPr>
+        <p:cNvPr id="1" name=""/>
+        <p:cNvGrpSpPr/>
+        <p:nvPr/>
+      </p:nvGrpSpPr>
+      <p:grpSpPr>
+        <a:xfrm>
+          <a:off x="0" y="0"/>
+          <a:ext cx="0" cy="0"/>
+          <a:chOff x="0" y="0"/>
+          <a:chExt cx="0" cy="0"/>
+        </a:xfrm>
+      </p:grpSpPr>
+      <p:sp>
+        <p:nvSpPr>
+          <p:cNvPr id="2" name="Slide Image Placeholder 1"/>
+          <p:cNvSpPr>
+            <a:spLocks noGrp="1" noRot="1" noChangeAspect="1"/>
+          </p:cNvSpPr>
+          <p:nvPr>
+            <p:ph type="sldImg"/>
+          </p:nvPr>
+        </p:nvSpPr>
+        <p:spPr/>
+      </p:sp>
+      <p:sp>
+        <p:nvSpPr>
+          <p:cNvPr id="3" name="Notes Placeholder 2"/>
+          <p:cNvSpPr>
+            <a:spLocks noGrp="1"/>
+          </p:cNvSpPr>
+          <p:nvPr>
+            <p:ph type="body" idx="1"/>
+          </p:nvPr>
+        </p:nvSpPr>
+        <p:spPr/>
+        <p:txBody>
+          <a:bodyPr>
+            <a:normAutofit/>
+          </a:bodyPr>
+          <a:lstStyle/>
+          <a:p>
+            <a:r>
+              <a:rPr lang="en-US" dirty="0" smtClean="0"/>
+              <a:t>Web App:</a:t>
+            </a:r>
+          </a:p>
+          <a:p>
+            <a:r>
+              <a:rPr lang="en-US" dirty="0" smtClean="0"/>
+              <a:t>Show using different browsers</a:t>
+            </a:r>
+          </a:p>
+          <a:p>
+            <a:r>
+              <a:rPr lang="en-US" dirty="0" smtClean="0"/>
+              <a:t>Show using PC and handheld devices</a:t>
+            </a:r>
+          </a:p>
+          <a:p>
+            <a:endParaRPr lang="en-US" dirty="0" smtClean="0"/>
+          </a:p>
+          <a:p>
+            <a:r>
+              <a:rPr lang="en-US" dirty="0" smtClean="0"/>
+              <a:t>Also DEMO:</a:t>
+            </a:r>
+          </a:p>
+          <a:p>
+            <a:pPr>
+              <a:buFont typeface="Arial" charset="0"/>
+              <a:buChar char="•"/>
+            </a:pPr>
+            <a:r>
+              <a:rPr lang="en-US" baseline="0" dirty="0" smtClean="0"/>
+              <a:t>Meade </a:t>
+            </a:r>
+            <a:r>
+              <a:rPr lang="en-US" baseline="0" dirty="0" err="1" smtClean="0"/>
+              <a:t>Autostars</a:t>
+            </a:r>
+            <a:r>
+              <a:rPr lang="en-US" baseline="0" dirty="0" smtClean="0"/>
+              <a:t> program</a:t>
+            </a:r>
+          </a:p>
+          <a:p>
+            <a:pPr>
+              <a:buFont typeface="Arial" charset="0"/>
+              <a:buChar char="•"/>
+            </a:pPr>
+            <a:r>
+              <a:rPr lang="en-US" baseline="0" dirty="0" smtClean="0"/>
+              <a:t>Winstars2</a:t>
+            </a:r>
+          </a:p>
+          <a:p>
+            <a:pPr>
+              <a:buFont typeface="Arial" charset="0"/>
+              <a:buChar char="•"/>
+            </a:pPr>
+            <a:r>
+              <a:rPr lang="en-US" baseline="0" dirty="0" smtClean="0"/>
+              <a:t>Hardware (telescope)</a:t>
+            </a:r>
+            <a:endParaRPr lang="en-CA" dirty="0" smtClean="0"/>
+          </a:p>
+          <a:p>
+            <a:endParaRPr lang="en-US" dirty="0"/>
+          </a:p>
+        </p:txBody>
+      </p:sp>
+      <p:sp>
+        <p:nvSpPr>
+          <p:cNvPr id="4" name="Slide Number Placeholder 3"/>
+          <p:cNvSpPr>
+            <a:spLocks noGrp="1"/>
+          </p:cNvSpPr>
+          <p:nvPr>
+            <p:ph type="sldNum" sz="quarter" idx="10"/>
+          </p:nvPr>
+        </p:nvSpPr>
+        <p:spPr/>
+        <p:txBody>
+          <a:bodyPr/>
+          <a:lstStyle/>
+          <a:p>
+            <a:fld id="{64EF572D-EF5B-479C-89C5-F647D7191839}" type="slidenum">
+              <a:rPr lang="en-CA" smtClean="0"/>
+              <a:pPr/>
+              <a:t>26</a:t>
+            </a:fld>
+            <a:endParaRPr lang="en-CA"/>
+          </a:p>
+        </p:txBody>
+      </p:sp>
+    </p:spTree>
+  </p:cSld>
+  <p:clrMapOvr>
+    <a:masterClrMapping/>
+  </p:clrMapOvr>
+</p:notes>
+</file>
+
 <file path=ppt/notesSlides/notesSlide2.xml><?xml version="1.0" encoding="utf-8"?>
 <p:notes xmlns:a="http://schemas.openxmlformats.org/drawingml/2006/main" xmlns:r="http://schemas.openxmlformats.org/officeDocument/2006/relationships" xmlns:p="http://schemas.openxmlformats.org/presentationml/2006/main">
   <p:cSld>
@@ -711,7 +1057,19 @@
           </a:bodyPr>
           <a:lstStyle/>
           <a:p>
-            <a:endParaRPr lang="en-CA" dirty="0"/>
+            <a:r>
+              <a:rPr lang="en-US" dirty="0" smtClean="0"/>
+              <a:t>Show </a:t>
+            </a:r>
+            <a:r>
+              <a:rPr lang="en-US" dirty="0" err="1" smtClean="0"/>
+              <a:t>youtube</a:t>
+            </a:r>
+            <a:r>
+              <a:rPr lang="en-US" baseline="0" dirty="0" smtClean="0"/>
+              <a:t> video</a:t>
+            </a:r>
+            <a:endParaRPr lang="en-US" dirty="0"/>
           </a:p>
         </p:txBody>
       </p:sp>
@@ -733,7 +1091,7 @@
             <a:fld id="{64EF572D-EF5B-479C-89C5-F647D7191839}" type="slidenum">
               <a:rPr lang="en-CA" smtClean="0"/>
               <a:pPr/>
-              <a:t>6</a:t>
+              <a:t>5</a:t>
             </a:fld>
             <a:endParaRPr lang="en-CA"/>
           </a:p>
@@ -823,7 +1181,7 @@
             <a:fld id="{64EF572D-EF5B-479C-89C5-F647D7191839}" type="slidenum">
               <a:rPr lang="en-CA" smtClean="0"/>
               <a:pPr/>
-              <a:t>7</a:t>
+              <a:t>6</a:t>
             </a:fld>
             <a:endParaRPr lang="en-CA"/>
           </a:p>
@@ -879,109 +1237,34 @@
         <p:spPr/>
         <p:txBody>
           <a:bodyPr>
-            <a:normAutofit fontScale="92500" lnSpcReduction="20000"/>
+            <a:normAutofit/>
           </a:bodyPr>
           <a:lstStyle/>
           <a:p>
             <a:r>
               <a:rPr lang="en-US" dirty="0" smtClean="0"/>
-              <a:t>http://guides.rubyonrails.org/getting_started.html</a:t>
-            </a:r>
-          </a:p>
-          <a:p>
-            <a:endParaRPr lang="en-US" dirty="0" smtClean="0"/>
-          </a:p>
-          <a:p>
-            <a:r>
-              <a:rPr lang="en-US" dirty="0" smtClean="0"/>
-              <a:t>The Rails philosophy includes several guiding principles:</a:t>
-            </a:r>
-          </a:p>
-          <a:p>
-            <a:r>
-              <a:rPr lang="en-US" dirty="0" smtClean="0"/>
-              <a:t>DRY – “Don’t Repeat Yourself” – suggests that writing the same code over and over again is a bad thing.</a:t>
-            </a:r>
-          </a:p>
-          <a:p>
-            <a:r>
-              <a:rPr lang="en-US" dirty="0" smtClean="0"/>
-              <a:t>Convention Over Configuration – means that Rails makes assumptions about what you want to do and how you’re going to do it, rather than letting you tweak every little thing through endless configuration files.</a:t>
-            </a:r>
-          </a:p>
-          <a:p>
-            <a:r>
-              <a:rPr lang="en-US" dirty="0" smtClean="0"/>
-              <a:t>REST is the best pattern for web applications – organizing your application around resources and standard HTTP verbs is the fastest way to go.</a:t>
-            </a:r>
-          </a:p>
-          <a:p>
-            <a:endParaRPr lang="en-US" dirty="0" smtClean="0"/>
-          </a:p>
-          <a:p>
-            <a:r>
-              <a:rPr lang="en-US" dirty="0" smtClean="0"/>
-              <a:t>Rails is organized around the Model, View, Controller architecture, usually just called MVC. MVC benefits include:</a:t>
-            </a:r>
-          </a:p>
-          <a:p>
-            <a:r>
-              <a:rPr lang="en-US" dirty="0" smtClean="0"/>
-              <a:t>Isolation of business logic from the user interface</a:t>
-            </a:r>
-          </a:p>
-          <a:p>
-            <a:r>
-              <a:rPr lang="en-US" dirty="0" smtClean="0"/>
-              <a:t>Ease of keeping code DRY</a:t>
-            </a:r>
-          </a:p>
-          <a:p>
-            <a:r>
-              <a:rPr lang="en-US" dirty="0" smtClean="0"/>
-              <a:t>Making it clear where different types of code belong for easier maintenance</a:t>
-            </a:r>
-          </a:p>
-          <a:p>
-            <a:endParaRPr lang="en-US" dirty="0" smtClean="0"/>
-          </a:p>
-          <a:p>
-            <a:r>
-              <a:rPr lang="en-US" b="1" dirty="0" smtClean="0"/>
-              <a:t>2.1.1 Models</a:t>
-            </a:r>
-          </a:p>
-          <a:p>
-            <a:r>
-              <a:rPr lang="en-US" dirty="0" smtClean="0"/>
-              <a:t>A model represents the information (data) of the application and the rules to manipulate that data. In the case of Rails, models are primarily used for managing the rules of interaction with a corresponding database table. In most cases, one table in your database will correspond to one model in your application. The bulk of your application’s business logic will be concentrated in the models.</a:t>
-            </a:r>
-          </a:p>
-          <a:p>
-            <a:r>
-              <a:rPr lang="en-US" b="1" dirty="0" smtClean="0"/>
-              <a:t>2.1.2 Views</a:t>
-            </a:r>
-          </a:p>
-          <a:p>
-            <a:r>
-              <a:rPr lang="en-US" dirty="0" smtClean="0"/>
-              <a:t>Views represent the user interface of your application. In Rails, views are often HTML files with embedded Ruby code that performs tasks related solely to the presentation of the data. Views handle the job of providing data to the web browser or other tool that is used to make requests from your application.</a:t>
-            </a:r>
-          </a:p>
-          <a:p>
-            <a:r>
-              <a:rPr lang="en-US" b="1" dirty="0" smtClean="0"/>
-              <a:t>2.1.3 Controllers</a:t>
-            </a:r>
-          </a:p>
-          <a:p>
-            <a:r>
-              <a:rPr lang="en-US" dirty="0" smtClean="0"/>
-              <a:t>Controllers provide the “glue” between models and views. In Rails, controllers are responsible for processing the incoming requests from the web browser, interrogating the models for data, and passing that data on to the views for presentation.</a:t>
-            </a:r>
-          </a:p>
-          <a:p>
+              <a:t>Show </a:t>
+            </a:r>
+            <a:r>
+              <a:rPr lang="en-US" dirty="0" err="1" smtClean="0"/>
+              <a:t>meade</a:t>
+            </a:r>
+            <a:r>
+              <a:rPr lang="en-US" dirty="0" smtClean="0"/>
+              <a:t> </a:t>
+            </a:r>
+            <a:r>
+              <a:rPr lang="en-US" dirty="0" err="1" smtClean="0"/>
+              <a:t>autostars</a:t>
+            </a:r>
+            <a:r>
+              <a:rPr lang="en-US" dirty="0" smtClean="0"/>
+              <a:t> program and winstar2</a:t>
+            </a:r>
+            <a:r>
+              <a:rPr lang="en-US" baseline="0" dirty="0" smtClean="0"/>
+              <a:t> program</a:t>
+            </a:r>
             <a:endParaRPr lang="en-US" dirty="0"/>
           </a:p>
         </p:txBody>
@@ -1004,7 +1287,7 @@
             <a:fld id="{64EF572D-EF5B-479C-89C5-F647D7191839}" type="slidenum">
               <a:rPr lang="en-CA" smtClean="0"/>
               <a:pPr/>
-              <a:t>10</a:t>
+              <a:t>8</a:t>
             </a:fld>
             <a:endParaRPr lang="en-CA"/>
           </a:p>
@@ -1064,36 +1347,6 @@
           </a:bodyPr>
           <a:lstStyle/>
           <a:p>
-            <a:r>
-              <a:rPr lang="en-US" dirty="0" smtClean="0"/>
-              <a:t>Note: </a:t>
-            </a:r>
-          </a:p>
-          <a:p>
-            <a:pPr>
-              <a:buFontTx/>
-              <a:buChar char="-"/>
-            </a:pPr>
-            <a:r>
-              <a:rPr lang="en-US" dirty="0" smtClean="0"/>
-              <a:t> users may also</a:t>
-            </a:r>
-            <a:r>
-              <a:rPr lang="en-US" baseline="0" dirty="0" smtClean="0"/>
-              <a:t> connect to the web application via HTTPS</a:t>
-            </a:r>
-          </a:p>
-          <a:p>
-            <a:pPr>
-              <a:buFontTx/>
-              <a:buChar char="-"/>
-            </a:pPr>
-            <a:r>
-              <a:rPr lang="en-US" baseline="0" dirty="0" smtClean="0"/>
-              <a:t> application which controls the telescope and camera may be written in C#</a:t>
-            </a:r>
-          </a:p>
-          <a:p>
             <a:endParaRPr lang="en-CA" dirty="0"/>
           </a:p>
         </p:txBody>
@@ -1116,7 +1369,7 @@
             <a:fld id="{64EF572D-EF5B-479C-89C5-F647D7191839}" type="slidenum">
               <a:rPr lang="en-CA" smtClean="0"/>
               <a:pPr/>
-              <a:t>12</a:t>
+              <a:t>9</a:t>
             </a:fld>
             <a:endParaRPr lang="en-CA"/>
           </a:p>
@@ -1176,7 +1429,7 @@
           </a:bodyPr>
           <a:lstStyle/>
           <a:p>
-            <a:endParaRPr lang="en-US" dirty="0"/>
+            <a:endParaRPr lang="en-CA" dirty="0"/>
           </a:p>
         </p:txBody>
       </p:sp>
@@ -1198,7 +1451,7 @@
             <a:fld id="{64EF572D-EF5B-479C-89C5-F647D7191839}" type="slidenum">
               <a:rPr lang="en-CA" smtClean="0"/>
               <a:pPr/>
-              <a:t>14</a:t>
+              <a:t>10</a:t>
             </a:fld>
             <a:endParaRPr lang="en-CA"/>
           </a:p>
@@ -1254,35 +1507,110 @@
         <p:spPr/>
         <p:txBody>
           <a:bodyPr>
-            <a:normAutofit/>
+            <a:normAutofit fontScale="92500" lnSpcReduction="20000"/>
           </a:bodyPr>
           <a:lstStyle/>
           <a:p>
             <a:r>
-              <a:rPr lang="en-US" sz="1200" kern="1200" dirty="0" smtClean="0">
-                <a:solidFill>
-                  <a:schemeClr val="tx1"/>
-                </a:solidFill>
-                <a:latin typeface="+mn-lt"/>
-                <a:ea typeface="+mn-ea"/>
-                <a:cs typeface="+mn-cs"/>
-              </a:rPr>
-              <a:t>Probabilities can be: low, moderate, high.</a:t>
-            </a:r>
-          </a:p>
-          <a:p>
-            <a:r>
-              <a:rPr lang="en-US" sz="1200" kern="1200" smtClean="0">
-                <a:solidFill>
-                  <a:schemeClr val="tx1"/>
-                </a:solidFill>
-                <a:latin typeface="+mn-lt"/>
-                <a:ea typeface="+mn-ea"/>
-                <a:cs typeface="+mn-cs"/>
-              </a:rPr>
-              <a:t>Effects can be: tolerable, serious and catastrophic</a:t>
-            </a:r>
-            <a:endParaRPr lang="en-US"/>
+              <a:rPr lang="en-US" dirty="0" smtClean="0"/>
+              <a:t>http://guides.rubyonrails.org/getting_started.html</a:t>
+            </a:r>
+          </a:p>
+          <a:p>
+            <a:endParaRPr lang="en-US" dirty="0" smtClean="0"/>
+          </a:p>
+          <a:p>
+            <a:r>
+              <a:rPr lang="en-US" dirty="0" smtClean="0"/>
+              <a:t>The Rails philosophy includes several guiding principles:</a:t>
+            </a:r>
+          </a:p>
+          <a:p>
+            <a:r>
+              <a:rPr lang="en-US" dirty="0" smtClean="0"/>
+              <a:t>DRY – “Don’t Repeat Yourself” – suggests that writing the same code over and over again is a bad thing.</a:t>
+            </a:r>
+          </a:p>
+          <a:p>
+            <a:r>
+              <a:rPr lang="en-US" dirty="0" smtClean="0"/>
+              <a:t>Convention Over Configuration – means that Rails makes assumptions about what you want to do and how you’re going to do it, rather than letting you tweak every little thing through endless configuration files.</a:t>
+            </a:r>
+          </a:p>
+          <a:p>
+            <a:r>
+              <a:rPr lang="en-US" dirty="0" smtClean="0"/>
+              <a:t>REST is the best pattern for web applications – organizing your application around resources and standard HTTP verbs is the fastest way to go.</a:t>
+            </a:r>
+          </a:p>
+          <a:p>
+            <a:endParaRPr lang="en-US" dirty="0" smtClean="0"/>
+          </a:p>
+          <a:p>
+            <a:r>
+              <a:rPr lang="en-US" dirty="0" smtClean="0"/>
+              <a:t>Rails is organized around the Model, View, Controller architecture, usually just called MVC. MVC benefits include:</a:t>
+            </a:r>
+          </a:p>
+          <a:p>
+            <a:r>
+              <a:rPr lang="en-US" dirty="0" smtClean="0"/>
+              <a:t>Isolation of business logic from the user interface</a:t>
+            </a:r>
+          </a:p>
+          <a:p>
+            <a:r>
+              <a:rPr lang="en-US" dirty="0" smtClean="0"/>
+              <a:t>Ease of keeping code DRY</a:t>
+            </a:r>
+          </a:p>
+          <a:p>
+            <a:r>
+              <a:rPr lang="en-US" dirty="0" smtClean="0"/>
+              <a:t>Making it clear where different types of code belong for easier maintenance</a:t>
+            </a:r>
+          </a:p>
+          <a:p>
+            <a:endParaRPr lang="en-US" dirty="0" smtClean="0"/>
+          </a:p>
+          <a:p>
+            <a:r>
+              <a:rPr lang="en-US" b="1" dirty="0" smtClean="0"/>
+              <a:t>2.1.1 Models</a:t>
+            </a:r>
+          </a:p>
+          <a:p>
+            <a:r>
+              <a:rPr lang="en-US" dirty="0" smtClean="0"/>
+              <a:t>A model represents the information (data) of the application and the rules to manipulate that data. In the case of Rails, models are primarily used for managing the rules of interaction with a corresponding database table. In most cases, one table in your database will correspond to one model in your application. The bulk of your application’s business logic will be concentrated in the models.</a:t>
+            </a:r>
+          </a:p>
+          <a:p>
+            <a:r>
+              <a:rPr lang="en-US" b="1" dirty="0" smtClean="0"/>
+              <a:t>2.1.2 Views</a:t>
+            </a:r>
+          </a:p>
+          <a:p>
+            <a:r>
+              <a:rPr lang="en-US" dirty="0" smtClean="0"/>
+              <a:t>Views represent the user interface of your application. In Rails, views are often HTML files with embedded Ruby code that performs tasks related solely to the presentation of the data. Views handle the job of providing data to the web browser or other tool that is used to make requests from your application.</a:t>
+            </a:r>
+          </a:p>
+          <a:p>
+            <a:r>
+              <a:rPr lang="en-US" b="1" dirty="0" smtClean="0"/>
+              <a:t>2.1.3 Controllers</a:t>
+            </a:r>
+          </a:p>
+          <a:p>
+            <a:r>
+              <a:rPr lang="en-US" dirty="0" smtClean="0"/>
+              <a:t>Controllers provide the “glue” between models and views. In Rails, controllers are responsible for processing the incoming requests from the web browser, interrogating the models for data, and passing that data on to the views for presentation.</a:t>
+            </a:r>
+          </a:p>
+          <a:p>
+            <a:endParaRPr lang="en-US" dirty="0"/>
           </a:p>
         </p:txBody>
       </p:sp>
@@ -1304,7 +1632,7 @@
             <a:fld id="{64EF572D-EF5B-479C-89C5-F647D7191839}" type="slidenum">
               <a:rPr lang="en-CA" smtClean="0"/>
               <a:pPr/>
-              <a:t>20</a:t>
+              <a:t>12</a:t>
             </a:fld>
             <a:endParaRPr lang="en-CA"/>
           </a:p>
@@ -1366,71 +1694,35 @@
           <a:p>
             <a:r>
               <a:rPr lang="en-US" dirty="0" smtClean="0"/>
-              <a:t>Web App:</a:t>
-            </a:r>
-          </a:p>
-          <a:p>
-            <a:r>
-              <a:rPr lang="en-US" dirty="0" smtClean="0"/>
-              <a:t>Show using different browsers</a:t>
-            </a:r>
-          </a:p>
-          <a:p>
-            <a:r>
-              <a:rPr lang="en-US" dirty="0" smtClean="0"/>
-              <a:t>Show using PC and handheld devices</a:t>
-            </a:r>
-          </a:p>
-          <a:p>
-            <a:endParaRPr lang="en-US" dirty="0" smtClean="0"/>
-          </a:p>
-          <a:p>
-            <a:r>
-              <a:rPr lang="en-US" dirty="0" smtClean="0"/>
-              <a:t>Also DEMO:</a:t>
+              <a:t>Note: </a:t>
             </a:r>
           </a:p>
           <a:p>
             <a:pPr>
-              <a:buFont typeface="Arial" charset="0"/>
-              <a:buChar char="•"/>
+              <a:buFontTx/>
+              <a:buChar char="-"/>
             </a:pPr>
             <a:r>
+              <a:rPr lang="en-US" dirty="0" smtClean="0"/>
+              <a:t> users may also</a:t>
+            </a:r>
+            <a:r>
               <a:rPr lang="en-US" baseline="0" dirty="0" smtClean="0"/>
-              <a:t>Meade </a:t>
-            </a:r>
-            <a:r>
-              <a:rPr lang="en-US" baseline="0" dirty="0" err="1" smtClean="0"/>
-              <a:t>Autostars</a:t>
-            </a:r>
+              <a:t> connect to the web application via HTTPS</a:t>
+            </a:r>
+          </a:p>
+          <a:p>
+            <a:pPr>
+              <a:buFontTx/>
+              <a:buChar char="-"/>
+            </a:pPr>
             <a:r>
               <a:rPr lang="en-US" baseline="0" dirty="0" smtClean="0"/>
-              <a:t> program</a:t>
-            </a:r>
-          </a:p>
-          <a:p>
-            <a:pPr>
-              <a:buFont typeface="Arial" charset="0"/>
-              <a:buChar char="•"/>
-            </a:pPr>
-            <a:r>
-              <a:rPr lang="en-US" baseline="0" dirty="0" smtClean="0"/>
-              <a:t>Winstars2</a:t>
-            </a:r>
-          </a:p>
-          <a:p>
-            <a:pPr>
-              <a:buFont typeface="Arial" charset="0"/>
-              <a:buChar char="•"/>
-            </a:pPr>
-            <a:r>
-              <a:rPr lang="en-US" baseline="0" dirty="0" smtClean="0"/>
-              <a:t>Hardware (telescope)</a:t>
-            </a:r>
-            <a:endParaRPr lang="en-CA" dirty="0" smtClean="0"/>
-          </a:p>
-          <a:p>
-            <a:endParaRPr lang="en-US" dirty="0"/>
+              <a:t> application which controls the telescope and camera may be written in C#</a:t>
+            </a:r>
+          </a:p>
+          <a:p>
+            <a:endParaRPr lang="en-CA" dirty="0"/>
           </a:p>
         </p:txBody>
       </p:sp>
@@ -1452,7 +1744,89 @@
             <a:fld id="{64EF572D-EF5B-479C-89C5-F647D7191839}" type="slidenum">
               <a:rPr lang="en-CA" smtClean="0"/>
               <a:pPr/>
-              <a:t>24</a:t>
+              <a:t>14</a:t>
+            </a:fld>
+            <a:endParaRPr lang="en-CA"/>
+          </a:p>
+        </p:txBody>
+      </p:sp>
+    </p:spTree>
+  </p:cSld>
+  <p:clrMapOvr>
+    <a:masterClrMapping/>
+  </p:clrMapOvr>
+</p:notes>
+</file>
+
+<file path=ppt/notesSlides/notesSlide9.xml><?xml version="1.0" encoding="utf-8"?>
+<p:notes xmlns:a="http://schemas.openxmlformats.org/drawingml/2006/main" xmlns:r="http://schemas.openxmlformats.org/officeDocument/2006/relationships" xmlns:p="http://schemas.openxmlformats.org/presentationml/2006/main">
+  <p:cSld>
+    <p:spTree>
+      <p:nvGrpSpPr>
+        <p:cNvPr id="1" name=""/>
+        <p:cNvGrpSpPr/>
+        <p:nvPr/>
+      </p:nvGrpSpPr>
+      <p:grpSpPr>
+        <a:xfrm>
+          <a:off x="0" y="0"/>
+          <a:ext cx="0" cy="0"/>
+          <a:chOff x="0" y="0"/>
+          <a:chExt cx="0" cy="0"/>
+        </a:xfrm>
+      </p:grpSpPr>
+      <p:sp>
+        <p:nvSpPr>
+          <p:cNvPr id="2" name="Slide Image Placeholder 1"/>
+          <p:cNvSpPr>
+            <a:spLocks noGrp="1" noRot="1" noChangeAspect="1"/>
+          </p:cNvSpPr>
+          <p:nvPr>
+            <p:ph type="sldImg"/>
+          </p:nvPr>
+        </p:nvSpPr>
+        <p:spPr/>
+      </p:sp>
+      <p:sp>
+        <p:nvSpPr>
+          <p:cNvPr id="3" name="Notes Placeholder 2"/>
+          <p:cNvSpPr>
+            <a:spLocks noGrp="1"/>
+          </p:cNvSpPr>
+          <p:nvPr>
+            <p:ph type="body" idx="1"/>
+          </p:nvPr>
+        </p:nvSpPr>
+        <p:spPr/>
+        <p:txBody>
+          <a:bodyPr>
+            <a:normAutofit/>
+          </a:bodyPr>
+          <a:lstStyle/>
+          <a:p>
+            <a:endParaRPr lang="en-US" dirty="0"/>
+          </a:p>
+        </p:txBody>
+      </p:sp>
+      <p:sp>
+        <p:nvSpPr>
+          <p:cNvPr id="4" name="Slide Number Placeholder 3"/>
+          <p:cNvSpPr>
+            <a:spLocks noGrp="1"/>
+          </p:cNvSpPr>
+          <p:nvPr>
+            <p:ph type="sldNum" sz="quarter" idx="10"/>
+          </p:nvPr>
+        </p:nvSpPr>
+        <p:spPr/>
+        <p:txBody>
+          <a:bodyPr/>
+          <a:lstStyle/>
+          <a:p>
+            <a:fld id="{64EF572D-EF5B-479C-89C5-F647D7191839}" type="slidenum">
+              <a:rPr lang="en-CA" smtClean="0"/>
+              <a:pPr/>
+              <a:t>16</a:t>
             </a:fld>
             <a:endParaRPr lang="en-CA"/>
           </a:p>
@@ -1648,7 +2022,7 @@
             <a:fld id="{471E1C79-A119-44DE-84CD-391F73B5F415}" type="datetimeFigureOut">
               <a:rPr lang="en-US" smtClean="0"/>
               <a:pPr/>
-              <a:t>12/1/2009</a:t>
+              <a:t>12/2/2009</a:t>
             </a:fld>
             <a:endParaRPr lang="en-CA"/>
           </a:p>
@@ -1815,7 +2189,7 @@
             <a:fld id="{471E1C79-A119-44DE-84CD-391F73B5F415}" type="datetimeFigureOut">
               <a:rPr lang="en-US" smtClean="0"/>
               <a:pPr/>
-              <a:t>12/1/2009</a:t>
+              <a:t>12/2/2009</a:t>
             </a:fld>
             <a:endParaRPr lang="en-CA"/>
           </a:p>
@@ -1992,7 +2366,7 @@
             <a:fld id="{471E1C79-A119-44DE-84CD-391F73B5F415}" type="datetimeFigureOut">
               <a:rPr lang="en-US" smtClean="0"/>
               <a:pPr/>
-              <a:t>12/1/2009</a:t>
+              <a:t>12/2/2009</a:t>
             </a:fld>
             <a:endParaRPr lang="en-CA"/>
           </a:p>
@@ -2159,7 +2533,7 @@
             <a:fld id="{471E1C79-A119-44DE-84CD-391F73B5F415}" type="datetimeFigureOut">
               <a:rPr lang="en-US" smtClean="0"/>
               <a:pPr/>
-              <a:t>12/1/2009</a:t>
+              <a:t>12/2/2009</a:t>
             </a:fld>
             <a:endParaRPr lang="en-CA"/>
           </a:p>
@@ -2402,7 +2776,7 @@
             <a:fld id="{471E1C79-A119-44DE-84CD-391F73B5F415}" type="datetimeFigureOut">
               <a:rPr lang="en-US" smtClean="0"/>
               <a:pPr/>
-              <a:t>12/1/2009</a:t>
+              <a:t>12/2/2009</a:t>
             </a:fld>
             <a:endParaRPr lang="en-CA"/>
           </a:p>
@@ -2687,7 +3061,7 @@
             <a:fld id="{471E1C79-A119-44DE-84CD-391F73B5F415}" type="datetimeFigureOut">
               <a:rPr lang="en-US" smtClean="0"/>
               <a:pPr/>
-              <a:t>12/1/2009</a:t>
+              <a:t>12/2/2009</a:t>
             </a:fld>
             <a:endParaRPr lang="en-CA"/>
           </a:p>
@@ -3106,7 +3480,7 @@
             <a:fld id="{471E1C79-A119-44DE-84CD-391F73B5F415}" type="datetimeFigureOut">
               <a:rPr lang="en-US" smtClean="0"/>
               <a:pPr/>
-              <a:t>12/1/2009</a:t>
+              <a:t>12/2/2009</a:t>
             </a:fld>
             <a:endParaRPr lang="en-CA"/>
           </a:p>
@@ -3221,7 +3595,7 @@
             <a:fld id="{471E1C79-A119-44DE-84CD-391F73B5F415}" type="datetimeFigureOut">
               <a:rPr lang="en-US" smtClean="0"/>
               <a:pPr/>
-              <a:t>12/1/2009</a:t>
+              <a:t>12/2/2009</a:t>
             </a:fld>
             <a:endParaRPr lang="en-CA"/>
           </a:p>
@@ -3313,7 +3687,7 @@
             <a:fld id="{471E1C79-A119-44DE-84CD-391F73B5F415}" type="datetimeFigureOut">
               <a:rPr lang="en-US" smtClean="0"/>
               <a:pPr/>
-              <a:t>12/1/2009</a:t>
+              <a:t>12/2/2009</a:t>
             </a:fld>
             <a:endParaRPr lang="en-CA"/>
           </a:p>
@@ -3587,7 +3961,7 @@
             <a:fld id="{471E1C79-A119-44DE-84CD-391F73B5F415}" type="datetimeFigureOut">
               <a:rPr lang="en-US" smtClean="0"/>
               <a:pPr/>
-              <a:t>12/1/2009</a:t>
+              <a:t>12/2/2009</a:t>
             </a:fld>
             <a:endParaRPr lang="en-CA"/>
           </a:p>
@@ -3837,7 +4211,7 @@
             <a:fld id="{471E1C79-A119-44DE-84CD-391F73B5F415}" type="datetimeFigureOut">
               <a:rPr lang="en-US" smtClean="0"/>
               <a:pPr/>
-              <a:t>12/1/2009</a:t>
+              <a:t>12/2/2009</a:t>
             </a:fld>
             <a:endParaRPr lang="en-CA"/>
           </a:p>
@@ -4056,7 +4430,7 @@
             <a:fld id="{471E1C79-A119-44DE-84CD-391F73B5F415}" type="datetimeFigureOut">
               <a:rPr lang="en-US" smtClean="0"/>
               <a:pPr/>
-              <a:t>12/1/2009</a:t>
+              <a:t>12/2/2009</a:t>
             </a:fld>
             <a:endParaRPr lang="en-CA"/>
           </a:p>
@@ -4621,14 +4995,32 @@
               <a:schemeClr val="accent1"/>
             </a:solidFill>
           </a:ln>
+          <a:effectLst>
+            <a:glow rad="63500">
+              <a:schemeClr val="accent1">
+                <a:satMod val="175000"/>
+                <a:alpha val="40000"/>
+              </a:schemeClr>
+            </a:glow>
+          </a:effectLst>
         </p:spPr>
         <p:txBody>
-          <a:bodyPr/>
-          <a:lstStyle/>
-          <a:p>
-            <a:r>
-              <a:rPr lang="en-US" dirty="0" smtClean="0"/>
-              <a:t>Ruby on Rails</a:t>
+          <a:bodyPr>
+            <a:normAutofit fontScale="90000"/>
+          </a:bodyPr>
+          <a:lstStyle/>
+          <a:p>
+            <a:r>
+              <a:rPr lang="en-US" dirty="0" err="1" smtClean="0"/>
+              <a:t>Xtreme</a:t>
+            </a:r>
+            <a:r>
+              <a:rPr lang="en-US" dirty="0" smtClean="0"/>
+              <a:t> </a:t>
+            </a:r>
+            <a:r>
+              <a:rPr lang="en-US" dirty="0" smtClean="0"/>
+              <a:t>Programming SPIKE + Demo</a:t>
             </a:r>
             <a:endParaRPr lang="en-CA" dirty="0"/>
           </a:p>
@@ -4645,6 +5037,10 @@
           </p:nvPr>
         </p:nvSpPr>
         <p:spPr>
+          <a:xfrm>
+            <a:off x="457200" y="1600201"/>
+            <a:ext cx="8229600" cy="4472006"/>
+          </a:xfrm>
           <a:solidFill>
             <a:srgbClr val="000000"/>
           </a:solidFill>
@@ -4653,6 +5049,17 @@
               <a:schemeClr val="accent1"/>
             </a:solidFill>
           </a:ln>
+          <a:effectLst>
+            <a:glow rad="63500">
+              <a:schemeClr val="accent1">
+                <a:satMod val="175000"/>
+                <a:alpha val="40000"/>
+              </a:schemeClr>
+            </a:glow>
+            <a:outerShdw blurRad="107950" dist="12700" dir="5400000" algn="ctr">
+              <a:srgbClr val="000000"/>
+            </a:outerShdw>
+          </a:effectLst>
         </p:spPr>
         <p:txBody>
           <a:bodyPr>
@@ -4662,44 +5069,33 @@
           <a:p>
             <a:r>
               <a:rPr lang="en-US" dirty="0" smtClean="0"/>
-              <a:t>Framework for fast generation of web applications.</a:t>
-            </a:r>
-            <a:endParaRPr lang="en-US" dirty="0"/>
-          </a:p>
-          <a:p>
-            <a:r>
-              <a:rPr lang="en-US" dirty="0" smtClean="0"/>
-              <a:t>Comparatively easy to learn.</a:t>
-            </a:r>
-            <a:endParaRPr lang="en-US" dirty="0"/>
-          </a:p>
-          <a:p>
-            <a:r>
-              <a:rPr lang="en-US" dirty="0" smtClean="0"/>
-              <a:t>Enforces software patterns such as Model-View-Controller.</a:t>
-            </a:r>
-            <a:endParaRPr lang="en-US" dirty="0"/>
-          </a:p>
-          <a:p>
-            <a:r>
-              <a:rPr lang="en-US" dirty="0" err="1" smtClean="0"/>
-              <a:t>RESTful</a:t>
-            </a:r>
-            <a:r>
-              <a:rPr lang="en-US" dirty="0" smtClean="0"/>
-              <a:t> architecture.</a:t>
-            </a:r>
-          </a:p>
-          <a:p>
-            <a:r>
-              <a:rPr lang="en-US" dirty="0" smtClean="0"/>
-              <a:t>“DRY” code.</a:t>
-            </a:r>
-          </a:p>
-          <a:p>
-            <a:r>
-              <a:rPr lang="en-US" dirty="0" smtClean="0"/>
-              <a:t>Convention Over Configuration</a:t>
+              <a:t>In order to learn the fundamentals of XP, we had a 6.5 week SPIKE project whos</a:t>
+            </a:r>
+            <a:r>
+              <a:rPr lang="en-US" dirty="0" smtClean="0"/>
+              <a:t>e goal is to emulate a board game called DVONN.</a:t>
+            </a:r>
+          </a:p>
+          <a:p>
+            <a:endParaRPr lang="en-US" dirty="0" smtClean="0"/>
+          </a:p>
+          <a:p>
+            <a:r>
+              <a:rPr lang="en-US" dirty="0" smtClean="0"/>
+              <a:t>Written in Java using the SWING package.</a:t>
+            </a:r>
+          </a:p>
+          <a:p>
+            <a:endParaRPr lang="en-US" dirty="0" smtClean="0"/>
+          </a:p>
+          <a:p>
+            <a:r>
+              <a:rPr lang="en-US" dirty="0" smtClean="0"/>
+              <a:t>For more information on the game, see</a:t>
+            </a:r>
+            <a:r>
+              <a:rPr lang="en-US" dirty="0" smtClean="0"/>
+              <a:t>:  http://www.gipf.com/dvonn/index.html</a:t>
             </a:r>
             <a:endParaRPr lang="en-CA" dirty="0"/>
           </a:p>
@@ -4710,6 +5106,13 @@
   <p:clrMapOvr>
     <a:masterClrMapping/>
   </p:clrMapOvr>
+  <p:timing>
+    <p:tnLst>
+      <p:par>
+        <p:cTn id="1" dur="indefinite" restart="never" nodeType="tmRoot"/>
+      </p:par>
+    </p:tnLst>
+  </p:timing>
 </p:sld>
 </file>
 
@@ -4756,7 +5159,7 @@
           <a:p>
             <a:r>
               <a:rPr lang="en-US" dirty="0" smtClean="0"/>
-              <a:t>Versioning Control</a:t>
+              <a:t>Web Application Components</a:t>
             </a:r>
             <a:endParaRPr lang="en-CA" dirty="0"/>
           </a:p>
@@ -4784,86 +5187,47 @@
         </p:spPr>
         <p:txBody>
           <a:bodyPr>
-            <a:normAutofit fontScale="92500" lnSpcReduction="10000"/>
+            <a:normAutofit/>
           </a:bodyPr>
           <a:lstStyle/>
           <a:p>
             <a:r>
               <a:rPr lang="en-US" dirty="0" smtClean="0"/>
-              <a:t>Used “Git”. Why?</a:t>
-            </a:r>
-          </a:p>
-          <a:p>
-            <a:pPr lvl="1"/>
-            <a:r>
-              <a:rPr lang="en-US" dirty="0" smtClean="0"/>
-              <a:t>See: </a:t>
-            </a:r>
-            <a:r>
-              <a:rPr lang="en-US" dirty="0" smtClean="0">
-                <a:hlinkClick r:id="rId2"/>
-              </a:rPr>
-              <a:t>http://whygitisbetterthanx.com/</a:t>
-            </a:r>
-            <a:endParaRPr lang="en-US" dirty="0" smtClean="0"/>
-          </a:p>
-          <a:p>
-            <a:pPr lvl="2"/>
-            <a:r>
-              <a:rPr lang="en-US" dirty="0" smtClean="0"/>
-              <a:t>Fast</a:t>
-            </a:r>
-          </a:p>
-          <a:p>
-            <a:pPr lvl="2"/>
-            <a:r>
-              <a:rPr lang="en-US" dirty="0" smtClean="0"/>
-              <a:t>Small</a:t>
-            </a:r>
-          </a:p>
-          <a:p>
-            <a:pPr lvl="2"/>
-            <a:r>
-              <a:rPr lang="en-US" dirty="0" smtClean="0"/>
-              <a:t>Local</a:t>
-            </a:r>
-          </a:p>
-          <a:p>
-            <a:pPr lvl="2"/>
-            <a:r>
-              <a:rPr lang="en-US" dirty="0" smtClean="0"/>
-              <a:t>Easy to learn</a:t>
-            </a:r>
-          </a:p>
-          <a:p>
-            <a:pPr lvl="2"/>
-            <a:r>
-              <a:rPr lang="en-US" dirty="0" smtClean="0"/>
-              <a:t>Distributed</a:t>
-            </a:r>
-            <a:endParaRPr lang="en-US" dirty="0"/>
-          </a:p>
-          <a:p>
-            <a:endParaRPr lang="en-US" dirty="0" smtClean="0"/>
-          </a:p>
-          <a:p>
+              <a:t>Framework: Ruby on Rails</a:t>
+            </a:r>
+          </a:p>
+          <a:p>
+            <a:r>
+              <a:rPr lang="en-US" dirty="0" smtClean="0"/>
+              <a:t>Language: Ruby</a:t>
+            </a:r>
+          </a:p>
+          <a:p>
+            <a:r>
+              <a:rPr lang="en-US" dirty="0" smtClean="0"/>
+              <a:t>Presentation: CSS</a:t>
+            </a:r>
+          </a:p>
+          <a:p>
+            <a:r>
+              <a:rPr lang="en-US" dirty="0" smtClean="0"/>
+              <a:t>Operating System: Fedora 11</a:t>
+            </a:r>
+          </a:p>
+          <a:p>
+            <a:r>
+              <a:rPr lang="en-US" dirty="0" smtClean="0"/>
+              <a:t>Web Server: Apache2 (Mongrel for development)</a:t>
+            </a:r>
+          </a:p>
+          <a:p>
+            <a:r>
+              <a:rPr lang="en-US" dirty="0" smtClean="0"/>
+              <a:t>Database: </a:t>
+            </a:r>
             <a:r>
               <a:rPr lang="en-US" dirty="0" err="1" smtClean="0"/>
-              <a:t>GitHub</a:t>
-            </a:r>
-            <a:r>
-              <a:rPr lang="en-US" dirty="0" smtClean="0"/>
-              <a:t> account, see: </a:t>
-            </a:r>
-            <a:r>
-              <a:rPr lang="en-US" dirty="0" smtClean="0">
-                <a:hlinkClick r:id="rId3"/>
-              </a:rPr>
-              <a:t>http://github.com/RedTeamCOSC470/Stargazer</a:t>
-            </a:r>
-            <a:r>
-              <a:rPr lang="en-US" dirty="0" smtClean="0"/>
-              <a:t> </a:t>
+              <a:t>SQLite</a:t>
             </a:r>
             <a:endParaRPr lang="en-CA" dirty="0"/>
           </a:p>
@@ -4878,6 +5242,309 @@
 </file>
 
 <file path=ppt/slides/slide12.xml><?xml version="1.0" encoding="utf-8"?>
+<p:sld xmlns:a="http://schemas.openxmlformats.org/drawingml/2006/main" xmlns:r="http://schemas.openxmlformats.org/officeDocument/2006/relationships" xmlns:p="http://schemas.openxmlformats.org/presentationml/2006/main">
+  <p:cSld>
+    <p:spTree>
+      <p:nvGrpSpPr>
+        <p:cNvPr id="1" name=""/>
+        <p:cNvGrpSpPr/>
+        <p:nvPr/>
+      </p:nvGrpSpPr>
+      <p:grpSpPr>
+        <a:xfrm>
+          <a:off x="0" y="0"/>
+          <a:ext cx="0" cy="0"/>
+          <a:chOff x="0" y="0"/>
+          <a:chExt cx="0" cy="0"/>
+        </a:xfrm>
+      </p:grpSpPr>
+      <p:sp>
+        <p:nvSpPr>
+          <p:cNvPr id="2" name="Title 1"/>
+          <p:cNvSpPr>
+            <a:spLocks noGrp="1"/>
+          </p:cNvSpPr>
+          <p:nvPr>
+            <p:ph type="title"/>
+          </p:nvPr>
+        </p:nvSpPr>
+        <p:spPr>
+          <a:solidFill>
+            <a:srgbClr val="000000"/>
+          </a:solidFill>
+          <a:ln>
+            <a:solidFill>
+              <a:schemeClr val="accent1"/>
+            </a:solidFill>
+          </a:ln>
+        </p:spPr>
+        <p:txBody>
+          <a:bodyPr/>
+          <a:lstStyle/>
+          <a:p>
+            <a:r>
+              <a:rPr lang="en-US" dirty="0" smtClean="0"/>
+              <a:t>Ruby on Rails</a:t>
+            </a:r>
+            <a:endParaRPr lang="en-CA" dirty="0"/>
+          </a:p>
+        </p:txBody>
+      </p:sp>
+      <p:sp>
+        <p:nvSpPr>
+          <p:cNvPr id="3" name="Content Placeholder 2"/>
+          <p:cNvSpPr>
+            <a:spLocks noGrp="1"/>
+          </p:cNvSpPr>
+          <p:nvPr>
+            <p:ph idx="1"/>
+          </p:nvPr>
+        </p:nvSpPr>
+        <p:spPr>
+          <a:solidFill>
+            <a:srgbClr val="000000"/>
+          </a:solidFill>
+          <a:ln>
+            <a:solidFill>
+              <a:schemeClr val="accent1"/>
+            </a:solidFill>
+          </a:ln>
+        </p:spPr>
+        <p:txBody>
+          <a:bodyPr>
+            <a:normAutofit/>
+          </a:bodyPr>
+          <a:lstStyle/>
+          <a:p>
+            <a:r>
+              <a:rPr lang="en-US" dirty="0" smtClean="0"/>
+              <a:t>Framework for fast generation of web applications.</a:t>
+            </a:r>
+            <a:endParaRPr lang="en-US" dirty="0"/>
+          </a:p>
+          <a:p>
+            <a:r>
+              <a:rPr lang="en-US" dirty="0" smtClean="0"/>
+              <a:t>Comparatively easy to learn.</a:t>
+            </a:r>
+            <a:endParaRPr lang="en-US" dirty="0"/>
+          </a:p>
+          <a:p>
+            <a:r>
+              <a:rPr lang="en-US" dirty="0" smtClean="0"/>
+              <a:t>Enforces software patterns such as Model-View-Controller.</a:t>
+            </a:r>
+            <a:endParaRPr lang="en-US" dirty="0"/>
+          </a:p>
+          <a:p>
+            <a:r>
+              <a:rPr lang="en-US" dirty="0" err="1" smtClean="0"/>
+              <a:t>RESTful</a:t>
+            </a:r>
+            <a:r>
+              <a:rPr lang="en-US" dirty="0" smtClean="0"/>
+              <a:t> architecture.</a:t>
+            </a:r>
+          </a:p>
+          <a:p>
+            <a:r>
+              <a:rPr lang="en-US" dirty="0" smtClean="0"/>
+              <a:t>“DRY” code.</a:t>
+            </a:r>
+          </a:p>
+          <a:p>
+            <a:r>
+              <a:rPr lang="en-US" dirty="0" smtClean="0"/>
+              <a:t>Convention Over Configuration</a:t>
+            </a:r>
+            <a:endParaRPr lang="en-CA" dirty="0"/>
+          </a:p>
+        </p:txBody>
+      </p:sp>
+    </p:spTree>
+  </p:cSld>
+  <p:clrMapOvr>
+    <a:masterClrMapping/>
+  </p:clrMapOvr>
+</p:sld>
+</file>
+
+<file path=ppt/slides/slide13.xml><?xml version="1.0" encoding="utf-8"?>
+<p:sld xmlns:a="http://schemas.openxmlformats.org/drawingml/2006/main" xmlns:r="http://schemas.openxmlformats.org/officeDocument/2006/relationships" xmlns:p="http://schemas.openxmlformats.org/presentationml/2006/main">
+  <p:cSld>
+    <p:spTree>
+      <p:nvGrpSpPr>
+        <p:cNvPr id="1" name=""/>
+        <p:cNvGrpSpPr/>
+        <p:nvPr/>
+      </p:nvGrpSpPr>
+      <p:grpSpPr>
+        <a:xfrm>
+          <a:off x="0" y="0"/>
+          <a:ext cx="0" cy="0"/>
+          <a:chOff x="0" y="0"/>
+          <a:chExt cx="0" cy="0"/>
+        </a:xfrm>
+      </p:grpSpPr>
+      <p:sp>
+        <p:nvSpPr>
+          <p:cNvPr id="2" name="Title 1"/>
+          <p:cNvSpPr>
+            <a:spLocks noGrp="1"/>
+          </p:cNvSpPr>
+          <p:nvPr>
+            <p:ph type="title"/>
+          </p:nvPr>
+        </p:nvSpPr>
+        <p:spPr>
+          <a:solidFill>
+            <a:srgbClr val="000000"/>
+          </a:solidFill>
+          <a:ln>
+            <a:solidFill>
+              <a:schemeClr val="accent1"/>
+            </a:solidFill>
+          </a:ln>
+        </p:spPr>
+        <p:txBody>
+          <a:bodyPr/>
+          <a:lstStyle/>
+          <a:p>
+            <a:r>
+              <a:rPr lang="en-US" dirty="0" smtClean="0"/>
+              <a:t>Versioning Control</a:t>
+            </a:r>
+            <a:endParaRPr lang="en-CA" dirty="0"/>
+          </a:p>
+        </p:txBody>
+      </p:sp>
+      <p:sp>
+        <p:nvSpPr>
+          <p:cNvPr id="3" name="Content Placeholder 2"/>
+          <p:cNvSpPr>
+            <a:spLocks noGrp="1"/>
+          </p:cNvSpPr>
+          <p:nvPr>
+            <p:ph idx="1"/>
+          </p:nvPr>
+        </p:nvSpPr>
+        <p:spPr>
+          <a:solidFill>
+            <a:srgbClr val="000000"/>
+          </a:solidFill>
+          <a:ln>
+            <a:solidFill>
+              <a:schemeClr val="accent1"/>
+            </a:solidFill>
+          </a:ln>
+        </p:spPr>
+        <p:txBody>
+          <a:bodyPr>
+            <a:normAutofit fontScale="92500" lnSpcReduction="10000"/>
+          </a:bodyPr>
+          <a:lstStyle/>
+          <a:p>
+            <a:r>
+              <a:rPr lang="en-US" dirty="0" smtClean="0"/>
+              <a:t>Used “Git”. Why?</a:t>
+            </a:r>
+          </a:p>
+          <a:p>
+            <a:pPr lvl="1"/>
+            <a:r>
+              <a:rPr lang="en-US" dirty="0" smtClean="0"/>
+              <a:t>See: </a:t>
+            </a:r>
+            <a:r>
+              <a:rPr lang="en-US" dirty="0" smtClean="0">
+                <a:hlinkClick r:id="rId2"/>
+              </a:rPr>
+              <a:t>http://whygitisbetterthanx.com/</a:t>
+            </a:r>
+            <a:endParaRPr lang="en-US" dirty="0" smtClean="0"/>
+          </a:p>
+          <a:p>
+            <a:pPr lvl="2"/>
+            <a:r>
+              <a:rPr lang="en-US" dirty="0" smtClean="0"/>
+              <a:t>Fast</a:t>
+            </a:r>
+          </a:p>
+          <a:p>
+            <a:pPr lvl="2"/>
+            <a:r>
+              <a:rPr lang="en-US" dirty="0" smtClean="0"/>
+              <a:t>Small</a:t>
+            </a:r>
+          </a:p>
+          <a:p>
+            <a:pPr lvl="2"/>
+            <a:r>
+              <a:rPr lang="en-US" dirty="0" smtClean="0"/>
+              <a:t>Local</a:t>
+            </a:r>
+          </a:p>
+          <a:p>
+            <a:pPr lvl="2"/>
+            <a:r>
+              <a:rPr lang="en-US" dirty="0" smtClean="0"/>
+              <a:t>Easy to learn</a:t>
+            </a:r>
+          </a:p>
+          <a:p>
+            <a:pPr lvl="2"/>
+            <a:r>
+              <a:rPr lang="en-US" dirty="0" smtClean="0"/>
+              <a:t>Distributed</a:t>
+            </a:r>
+            <a:endParaRPr lang="en-US" dirty="0"/>
+          </a:p>
+          <a:p>
+            <a:endParaRPr lang="en-US" dirty="0" smtClean="0"/>
+          </a:p>
+          <a:p>
+            <a:r>
+              <a:rPr lang="en-US" dirty="0" err="1" smtClean="0"/>
+              <a:t>GitHub</a:t>
+            </a:r>
+            <a:r>
+              <a:rPr lang="en-US" dirty="0" smtClean="0"/>
+              <a:t> account, see: </a:t>
+            </a:r>
+            <a:r>
+              <a:rPr lang="en-US" dirty="0" smtClean="0">
+                <a:solidFill>
+                  <a:srgbClr val="FF0000"/>
+                </a:solidFill>
+                <a:hlinkClick r:id="rId3"/>
+              </a:rPr>
+              <a:t>http://github.com/RedTeamCOSC470/Stargazer</a:t>
+            </a:r>
+            <a:r>
+              <a:rPr lang="en-US" dirty="0" smtClean="0">
+                <a:solidFill>
+                  <a:srgbClr val="FF0000"/>
+                </a:solidFill>
+              </a:rPr>
+              <a:t> </a:t>
+            </a:r>
+            <a:endParaRPr lang="en-CA" dirty="0">
+              <a:solidFill>
+                <a:srgbClr val="FF0000"/>
+              </a:solidFill>
+            </a:endParaRPr>
+          </a:p>
+        </p:txBody>
+      </p:sp>
+    </p:spTree>
+  </p:cSld>
+  <p:clrMapOvr>
+    <a:masterClrMapping/>
+  </p:clrMapOvr>
+</p:sld>
+</file>
+
+<file path=ppt/slides/slide14.xml><?xml version="1.0" encoding="utf-8"?>
 <p:sld xmlns:a="http://schemas.openxmlformats.org/drawingml/2006/main" xmlns:r="http://schemas.openxmlformats.org/officeDocument/2006/relationships" xmlns:p="http://schemas.openxmlformats.org/presentationml/2006/main">
   <p:cSld>
     <p:spTree>
@@ -4969,7 +5636,7 @@
 </p:sld>
 </file>
 
-<file path=ppt/slides/slide13.xml><?xml version="1.0" encoding="utf-8"?>
+<file path=ppt/slides/slide15.xml><?xml version="1.0" encoding="utf-8"?>
 <p:sld xmlns:a="http://schemas.openxmlformats.org/drawingml/2006/main" xmlns:r="http://schemas.openxmlformats.org/officeDocument/2006/relationships" xmlns:p="http://schemas.openxmlformats.org/presentationml/2006/main">
   <p:cSld>
     <p:spTree>
@@ -5012,7 +5679,7 @@
           <a:p>
             <a:r>
               <a:rPr lang="en-US" dirty="0" smtClean="0"/>
-              <a:t>Use Class Diagram</a:t>
+              <a:t>Use Case Diagram</a:t>
             </a:r>
             <a:endParaRPr lang="en-CA" dirty="0"/>
           </a:p>
@@ -5054,7 +5721,7 @@
 </p:sld>
 </file>
 
-<file path=ppt/slides/slide14.xml><?xml version="1.0" encoding="utf-8"?>
+<file path=ppt/slides/slide16.xml><?xml version="1.0" encoding="utf-8"?>
 <p:sld xmlns:a="http://schemas.openxmlformats.org/drawingml/2006/main" xmlns:r="http://schemas.openxmlformats.org/officeDocument/2006/relationships" xmlns:p="http://schemas.openxmlformats.org/presentationml/2006/main">
   <p:cSld>
     <p:spTree>
@@ -5097,7 +5764,7 @@
           <a:p>
             <a:r>
               <a:rPr lang="en-US" dirty="0" smtClean="0"/>
-              <a:t>Use Class Diagram</a:t>
+              <a:t>Domain Model</a:t>
             </a:r>
             <a:endParaRPr lang="en-CA" dirty="0"/>
           </a:p>
@@ -5146,382 +5813,6 @@
 </p:sld>
 </file>
 
-<file path=ppt/slides/slide15.xml><?xml version="1.0" encoding="utf-8"?>
-<p:sld xmlns:a="http://schemas.openxmlformats.org/drawingml/2006/main" xmlns:r="http://schemas.openxmlformats.org/officeDocument/2006/relationships" xmlns:p="http://schemas.openxmlformats.org/presentationml/2006/main">
-  <p:cSld>
-    <p:spTree>
-      <p:nvGrpSpPr>
-        <p:cNvPr id="1" name=""/>
-        <p:cNvGrpSpPr/>
-        <p:nvPr/>
-      </p:nvGrpSpPr>
-      <p:grpSpPr>
-        <a:xfrm>
-          <a:off x="0" y="0"/>
-          <a:ext cx="0" cy="0"/>
-          <a:chOff x="0" y="0"/>
-          <a:chExt cx="0" cy="0"/>
-        </a:xfrm>
-      </p:grpSpPr>
-      <p:sp>
-        <p:nvSpPr>
-          <p:cNvPr id="2" name="Title 1"/>
-          <p:cNvSpPr>
-            <a:spLocks noGrp="1"/>
-          </p:cNvSpPr>
-          <p:nvPr>
-            <p:ph type="title"/>
-          </p:nvPr>
-        </p:nvSpPr>
-        <p:spPr>
-          <a:solidFill>
-            <a:srgbClr val="000000"/>
-          </a:solidFill>
-          <a:ln>
-            <a:solidFill>
-              <a:schemeClr val="accent1"/>
-            </a:solidFill>
-          </a:ln>
-        </p:spPr>
-        <p:txBody>
-          <a:bodyPr/>
-          <a:lstStyle/>
-          <a:p>
-            <a:r>
-              <a:rPr lang="en-US" dirty="0" smtClean="0"/>
-              <a:t>Example: Ruby Code</a:t>
-            </a:r>
-            <a:endParaRPr lang="en-CA" dirty="0"/>
-          </a:p>
-        </p:txBody>
-      </p:sp>
-      <p:sp>
-        <p:nvSpPr>
-          <p:cNvPr id="3" name="Content Placeholder 2"/>
-          <p:cNvSpPr>
-            <a:spLocks noGrp="1"/>
-          </p:cNvSpPr>
-          <p:nvPr>
-            <p:ph idx="1"/>
-          </p:nvPr>
-        </p:nvSpPr>
-        <p:spPr>
-          <a:solidFill>
-            <a:srgbClr val="000000"/>
-          </a:solidFill>
-          <a:ln>
-            <a:solidFill>
-              <a:schemeClr val="accent1"/>
-            </a:solidFill>
-          </a:ln>
-        </p:spPr>
-        <p:txBody>
-          <a:bodyPr>
-            <a:normAutofit fontScale="70000" lnSpcReduction="20000"/>
-          </a:bodyPr>
-          <a:lstStyle/>
-          <a:p>
-            <a:pPr>
-              <a:buNone/>
-            </a:pPr>
-            <a:r>
-              <a:rPr lang="en-US" dirty="0" smtClean="0"/>
-              <a:t>class Schedule &lt; </a:t>
-            </a:r>
-            <a:r>
-              <a:rPr lang="en-US" dirty="0" err="1" smtClean="0"/>
-              <a:t>ActiveRecord</a:t>
-            </a:r>
-            <a:r>
-              <a:rPr lang="en-US" dirty="0" smtClean="0"/>
-              <a:t>::Base</a:t>
-            </a:r>
-          </a:p>
-          <a:p>
-            <a:pPr>
-              <a:buNone/>
-            </a:pPr>
-            <a:r>
-              <a:rPr lang="en-US" dirty="0" smtClean="0"/>
-              <a:t>	</a:t>
-            </a:r>
-            <a:r>
-              <a:rPr lang="en-US" dirty="0" err="1" smtClean="0"/>
-              <a:t>belongs_to</a:t>
-            </a:r>
-            <a:r>
-              <a:rPr lang="en-US" dirty="0" smtClean="0"/>
-              <a:t> :user</a:t>
-            </a:r>
-          </a:p>
-          <a:p>
-            <a:pPr>
-              <a:buNone/>
-            </a:pPr>
-            <a:r>
-              <a:rPr lang="en-US" dirty="0" smtClean="0"/>
-              <a:t>	</a:t>
-            </a:r>
-            <a:r>
-              <a:rPr lang="en-US" dirty="0" err="1" smtClean="0"/>
-              <a:t>has_many</a:t>
-            </a:r>
-            <a:r>
-              <a:rPr lang="en-US" dirty="0" smtClean="0"/>
-              <a:t> :images</a:t>
-            </a:r>
-          </a:p>
-          <a:p>
-            <a:pPr>
-              <a:buNone/>
-            </a:pPr>
-            <a:r>
-              <a:rPr lang="en-US" dirty="0" smtClean="0"/>
-              <a:t>	</a:t>
-            </a:r>
-          </a:p>
-          <a:p>
-            <a:pPr>
-              <a:buNone/>
-            </a:pPr>
-            <a:r>
-              <a:rPr lang="en-US" dirty="0" smtClean="0"/>
-              <a:t>	# make sure schedule cannot be before present time</a:t>
-            </a:r>
-          </a:p>
-          <a:p>
-            <a:pPr>
-              <a:buNone/>
-            </a:pPr>
-            <a:r>
-              <a:rPr lang="en-US" dirty="0" smtClean="0"/>
-              <a:t>	</a:t>
-            </a:r>
-            <a:r>
-              <a:rPr lang="en-US" dirty="0" err="1" smtClean="0"/>
-              <a:t>validates_datetime</a:t>
-            </a:r>
-            <a:r>
-              <a:rPr lang="en-US" dirty="0" smtClean="0"/>
-              <a:t> :</a:t>
-            </a:r>
-            <a:r>
-              <a:rPr lang="en-US" dirty="0" err="1" smtClean="0"/>
-              <a:t>start_time</a:t>
-            </a:r>
-            <a:r>
-              <a:rPr lang="en-US" dirty="0" smtClean="0"/>
-              <a:t>, :after =&gt; lambda { </a:t>
-            </a:r>
-            <a:r>
-              <a:rPr lang="en-US" dirty="0" err="1" smtClean="0"/>
-              <a:t>Time.now</a:t>
-            </a:r>
-            <a:r>
-              <a:rPr lang="en-US" dirty="0" smtClean="0"/>
-              <a:t> }, :</a:t>
-            </a:r>
-            <a:r>
-              <a:rPr lang="en-US" dirty="0" err="1" smtClean="0"/>
-              <a:t>after_message</a:t>
-            </a:r>
-            <a:r>
-              <a:rPr lang="en-US" dirty="0" smtClean="0"/>
-              <a:t> =&gt; "must be in the future"</a:t>
-            </a:r>
-          </a:p>
-          <a:p>
-            <a:pPr>
-              <a:buNone/>
-            </a:pPr>
-            <a:r>
-              <a:rPr lang="en-US" dirty="0" smtClean="0"/>
-              <a:t>	</a:t>
-            </a:r>
-          </a:p>
-          <a:p>
-            <a:pPr>
-              <a:buNone/>
-            </a:pPr>
-            <a:r>
-              <a:rPr lang="en-US" dirty="0" smtClean="0"/>
-              <a:t>	# make some fields required</a:t>
-            </a:r>
-          </a:p>
-          <a:p>
-            <a:pPr>
-              <a:buNone/>
-            </a:pPr>
-            <a:r>
-              <a:rPr lang="en-US" dirty="0" smtClean="0"/>
-              <a:t>	</a:t>
-            </a:r>
-            <a:r>
-              <a:rPr lang="en-US" dirty="0" err="1" smtClean="0"/>
-              <a:t>validates_presence_of</a:t>
-            </a:r>
-            <a:r>
-              <a:rPr lang="en-US" dirty="0" smtClean="0"/>
-              <a:t> :exposure, :declination, :</a:t>
-            </a:r>
-            <a:r>
-              <a:rPr lang="en-US" dirty="0" err="1" smtClean="0"/>
-              <a:t>right_ascension</a:t>
-            </a:r>
-            <a:endParaRPr lang="en-US" dirty="0" smtClean="0"/>
-          </a:p>
-          <a:p>
-            <a:pPr>
-              <a:buNone/>
-            </a:pPr>
-            <a:endParaRPr lang="en-US" dirty="0" smtClean="0"/>
-          </a:p>
-          <a:p>
-            <a:pPr>
-              <a:buNone/>
-            </a:pPr>
-            <a:r>
-              <a:rPr lang="en-US" dirty="0" smtClean="0"/>
-              <a:t>end</a:t>
-            </a:r>
-            <a:endParaRPr lang="en-CA" dirty="0"/>
-          </a:p>
-        </p:txBody>
-      </p:sp>
-    </p:spTree>
-  </p:cSld>
-  <p:clrMapOvr>
-    <a:masterClrMapping/>
-  </p:clrMapOvr>
-</p:sld>
-</file>
-
-<file path=ppt/slides/slide16.xml><?xml version="1.0" encoding="utf-8"?>
-<p:sld xmlns:a="http://schemas.openxmlformats.org/drawingml/2006/main" xmlns:r="http://schemas.openxmlformats.org/officeDocument/2006/relationships" xmlns:p="http://schemas.openxmlformats.org/presentationml/2006/main">
-  <p:cSld>
-    <p:spTree>
-      <p:nvGrpSpPr>
-        <p:cNvPr id="1" name=""/>
-        <p:cNvGrpSpPr/>
-        <p:nvPr/>
-      </p:nvGrpSpPr>
-      <p:grpSpPr>
-        <a:xfrm>
-          <a:off x="0" y="0"/>
-          <a:ext cx="0" cy="0"/>
-          <a:chOff x="0" y="0"/>
-          <a:chExt cx="0" cy="0"/>
-        </a:xfrm>
-      </p:grpSpPr>
-      <p:sp>
-        <p:nvSpPr>
-          <p:cNvPr id="2" name="Title 1"/>
-          <p:cNvSpPr>
-            <a:spLocks noGrp="1"/>
-          </p:cNvSpPr>
-          <p:nvPr>
-            <p:ph type="title"/>
-          </p:nvPr>
-        </p:nvSpPr>
-        <p:spPr>
-          <a:solidFill>
-            <a:srgbClr val="000000"/>
-          </a:solidFill>
-          <a:ln>
-            <a:solidFill>
-              <a:schemeClr val="accent1"/>
-            </a:solidFill>
-          </a:ln>
-        </p:spPr>
-        <p:txBody>
-          <a:bodyPr/>
-          <a:lstStyle/>
-          <a:p>
-            <a:r>
-              <a:rPr lang="en-US" dirty="0" smtClean="0"/>
-              <a:t>Testing</a:t>
-            </a:r>
-            <a:endParaRPr lang="en-CA" dirty="0"/>
-          </a:p>
-        </p:txBody>
-      </p:sp>
-      <p:sp>
-        <p:nvSpPr>
-          <p:cNvPr id="3" name="Content Placeholder 2"/>
-          <p:cNvSpPr>
-            <a:spLocks noGrp="1"/>
-          </p:cNvSpPr>
-          <p:nvPr>
-            <p:ph idx="1"/>
-          </p:nvPr>
-        </p:nvSpPr>
-        <p:spPr>
-          <a:solidFill>
-            <a:srgbClr val="000000"/>
-          </a:solidFill>
-          <a:ln>
-            <a:solidFill>
-              <a:schemeClr val="accent1"/>
-            </a:solidFill>
-          </a:ln>
-        </p:spPr>
-        <p:txBody>
-          <a:bodyPr>
-            <a:normAutofit/>
-          </a:bodyPr>
-          <a:lstStyle/>
-          <a:p>
-            <a:r>
-              <a:rPr lang="en-US" dirty="0" smtClean="0"/>
-              <a:t>Unit tests:</a:t>
-            </a:r>
-          </a:p>
-          <a:p>
-            <a:pPr lvl="1"/>
-            <a:r>
-              <a:rPr lang="en-US" dirty="0" smtClean="0"/>
-              <a:t>“Black box” tests to ensure functionality </a:t>
-            </a:r>
-            <a:r>
-              <a:rPr lang="en-US" dirty="0" err="1" smtClean="0"/>
-              <a:t>correctnessTest</a:t>
-            </a:r>
-            <a:r>
-              <a:rPr lang="en-US" dirty="0" smtClean="0"/>
-              <a:t> suite is used to run all unit tests whenever new code is added to the system</a:t>
-            </a:r>
-          </a:p>
-          <a:p>
-            <a:pPr lvl="1"/>
-            <a:r>
-              <a:rPr lang="en-US" dirty="0" smtClean="0"/>
-              <a:t>All tests must pass after the new code is added</a:t>
-            </a:r>
-          </a:p>
-          <a:p>
-            <a:r>
-              <a:rPr lang="en-US" dirty="0" smtClean="0"/>
-              <a:t>Acceptance tests:</a:t>
-            </a:r>
-          </a:p>
-          <a:p>
-            <a:pPr lvl="1"/>
-            <a:r>
-              <a:rPr lang="en-US" dirty="0" smtClean="0"/>
-              <a:t>“White box” tests used to ensure business “fit” of the system</a:t>
-            </a:r>
-            <a:endParaRPr lang="en-CA" dirty="0"/>
-          </a:p>
-        </p:txBody>
-      </p:sp>
-    </p:spTree>
-  </p:cSld>
-  <p:clrMapOvr>
-    <a:masterClrMapping/>
-  </p:clrMapOvr>
-</p:sld>
-</file>
-
 <file path=ppt/slides/slide17.xml><?xml version="1.0" encoding="utf-8"?>
 <p:sld xmlns:a="http://schemas.openxmlformats.org/drawingml/2006/main" xmlns:r="http://schemas.openxmlformats.org/officeDocument/2006/relationships" xmlns:p="http://schemas.openxmlformats.org/presentationml/2006/main">
   <p:cSld>
@@ -5565,7 +5856,7 @@
           <a:p>
             <a:r>
               <a:rPr lang="en-US" dirty="0" smtClean="0"/>
-              <a:t>Example: Unit Test + Demo</a:t>
+              <a:t>SSD: Create New Schedule</a:t>
             </a:r>
             <a:endParaRPr lang="en-CA" dirty="0"/>
           </a:p>
@@ -5573,7 +5864,7 @@
       </p:sp>
       <p:sp>
         <p:nvSpPr>
-          <p:cNvPr id="3" name="Content Placeholder 2"/>
+          <p:cNvPr id="4" name="Content Placeholder 3"/>
           <p:cNvSpPr>
             <a:spLocks noGrp="1"/>
           </p:cNvSpPr>
@@ -5581,281 +5872,12 @@
             <p:ph idx="1"/>
           </p:nvPr>
         </p:nvSpPr>
-        <p:spPr>
-          <a:solidFill>
-            <a:srgbClr val="000000"/>
-          </a:solidFill>
-          <a:ln>
-            <a:solidFill>
-              <a:schemeClr val="accent1"/>
-            </a:solidFill>
-          </a:ln>
-        </p:spPr>
-        <p:txBody>
-          <a:bodyPr>
-            <a:normAutofit fontScale="47500" lnSpcReduction="20000"/>
-          </a:bodyPr>
-          <a:lstStyle/>
-          <a:p>
-            <a:pPr>
-              <a:buNone/>
-            </a:pPr>
-            <a:r>
-              <a:rPr lang="en-US" dirty="0" smtClean="0"/>
-              <a:t>require '</a:t>
-            </a:r>
-            <a:r>
-              <a:rPr lang="en-US" dirty="0" err="1" smtClean="0"/>
-              <a:t>test_helper</a:t>
-            </a:r>
-            <a:r>
-              <a:rPr lang="en-US" dirty="0" smtClean="0"/>
-              <a:t>'</a:t>
-            </a:r>
-          </a:p>
-          <a:p>
-            <a:pPr>
-              <a:buNone/>
-            </a:pPr>
-            <a:endParaRPr lang="en-US" dirty="0" smtClean="0"/>
-          </a:p>
-          <a:p>
-            <a:pPr>
-              <a:buNone/>
-            </a:pPr>
-            <a:r>
-              <a:rPr lang="en-US" dirty="0" smtClean="0"/>
-              <a:t>class </a:t>
-            </a:r>
-            <a:r>
-              <a:rPr lang="en-US" dirty="0" err="1" smtClean="0"/>
-              <a:t>UserTest</a:t>
-            </a:r>
-            <a:r>
-              <a:rPr lang="en-US" dirty="0" smtClean="0"/>
-              <a:t> &lt; </a:t>
-            </a:r>
-            <a:r>
-              <a:rPr lang="en-US" dirty="0" err="1" smtClean="0"/>
-              <a:t>ActiveSupport</a:t>
-            </a:r>
-            <a:r>
-              <a:rPr lang="en-US" dirty="0" smtClean="0"/>
-              <a:t>::</a:t>
-            </a:r>
-            <a:r>
-              <a:rPr lang="en-US" dirty="0" err="1" smtClean="0"/>
-              <a:t>TestCase</a:t>
-            </a:r>
-            <a:endParaRPr lang="en-US" dirty="0" smtClean="0"/>
-          </a:p>
-          <a:p>
-            <a:pPr>
-              <a:buNone/>
-            </a:pPr>
-            <a:r>
-              <a:rPr lang="en-US" dirty="0" smtClean="0"/>
-              <a:t>	</a:t>
-            </a:r>
-          </a:p>
-          <a:p>
-            <a:pPr>
-              <a:buNone/>
-            </a:pPr>
-            <a:r>
-              <a:rPr lang="en-US" dirty="0" smtClean="0"/>
-              <a:t>  # create a user with necessary, correct input values for the following tests</a:t>
-            </a:r>
-          </a:p>
-          <a:p>
-            <a:pPr>
-              <a:buNone/>
-            </a:pPr>
-            <a:r>
-              <a:rPr lang="en-US" dirty="0" smtClean="0"/>
-              <a:t>  def setup</a:t>
-            </a:r>
-          </a:p>
-          <a:p>
-            <a:pPr>
-              <a:buNone/>
-            </a:pPr>
-            <a:r>
-              <a:rPr lang="en-US" dirty="0" smtClean="0"/>
-              <a:t>  	@user = </a:t>
-            </a:r>
-            <a:r>
-              <a:rPr lang="en-US" dirty="0" err="1" smtClean="0"/>
-              <a:t>User.new</a:t>
-            </a:r>
-            <a:endParaRPr lang="en-US" dirty="0" smtClean="0"/>
-          </a:p>
-          <a:p>
-            <a:pPr>
-              <a:buNone/>
-            </a:pPr>
-            <a:r>
-              <a:rPr lang="en-US" dirty="0" smtClean="0"/>
-              <a:t>  	@</a:t>
-            </a:r>
-            <a:r>
-              <a:rPr lang="en-US" dirty="0" err="1" smtClean="0"/>
-              <a:t>user.username</a:t>
-            </a:r>
-            <a:r>
-              <a:rPr lang="en-US" dirty="0" smtClean="0"/>
-              <a:t> = "</a:t>
-            </a:r>
-            <a:r>
-              <a:rPr lang="en-US" dirty="0" err="1" smtClean="0"/>
-              <a:t>unit_test</a:t>
-            </a:r>
-            <a:r>
-              <a:rPr lang="en-US" dirty="0" smtClean="0"/>
-              <a:t>"</a:t>
-            </a:r>
-          </a:p>
-          <a:p>
-            <a:pPr>
-              <a:buNone/>
-            </a:pPr>
-            <a:r>
-              <a:rPr lang="en-US" dirty="0" smtClean="0"/>
-              <a:t>  	@</a:t>
-            </a:r>
-            <a:r>
-              <a:rPr lang="en-US" dirty="0" err="1" smtClean="0"/>
-              <a:t>user.email</a:t>
-            </a:r>
-            <a:r>
-              <a:rPr lang="en-US" dirty="0" smtClean="0"/>
-              <a:t> = "unit@test.com"</a:t>
-            </a:r>
-          </a:p>
-          <a:p>
-            <a:pPr>
-              <a:buNone/>
-            </a:pPr>
-            <a:r>
-              <a:rPr lang="en-US" dirty="0" smtClean="0"/>
-              <a:t>    	@</a:t>
-            </a:r>
-            <a:r>
-              <a:rPr lang="en-US" dirty="0" err="1" smtClean="0"/>
-              <a:t>user.password</a:t>
-            </a:r>
-            <a:r>
-              <a:rPr lang="en-US" dirty="0" smtClean="0"/>
-              <a:t> = "test"</a:t>
-            </a:r>
-          </a:p>
-          <a:p>
-            <a:pPr>
-              <a:buNone/>
-            </a:pPr>
-            <a:r>
-              <a:rPr lang="en-US" dirty="0" smtClean="0"/>
-              <a:t>    	@</a:t>
-            </a:r>
-            <a:r>
-              <a:rPr lang="en-US" dirty="0" err="1" smtClean="0"/>
-              <a:t>user.password_confirmation</a:t>
-            </a:r>
-            <a:r>
-              <a:rPr lang="en-US" dirty="0" smtClean="0"/>
-              <a:t> = "test"</a:t>
-            </a:r>
-          </a:p>
-          <a:p>
-            <a:pPr>
-              <a:buNone/>
-            </a:pPr>
-            <a:r>
-              <a:rPr lang="en-US" dirty="0" smtClean="0"/>
-              <a:t>  end</a:t>
-            </a:r>
-          </a:p>
-          <a:p>
-            <a:pPr>
-              <a:buNone/>
-            </a:pPr>
-            <a:r>
-              <a:rPr lang="en-US" dirty="0" smtClean="0"/>
-              <a:t>  </a:t>
-            </a:r>
-          </a:p>
-          <a:p>
-            <a:pPr>
-              <a:buNone/>
-            </a:pPr>
-            <a:r>
-              <a:rPr lang="en-US" dirty="0" smtClean="0"/>
-              <a:t>  def </a:t>
-            </a:r>
-            <a:r>
-              <a:rPr lang="en-US" dirty="0" err="1" smtClean="0"/>
-              <a:t>test_username_cannot_be_null</a:t>
-            </a:r>
-            <a:endParaRPr lang="en-US" dirty="0" smtClean="0"/>
-          </a:p>
-          <a:p>
-            <a:pPr>
-              <a:buNone/>
-            </a:pPr>
-            <a:r>
-              <a:rPr lang="en-US" dirty="0" smtClean="0"/>
-              <a:t>    	@</a:t>
-            </a:r>
-            <a:r>
-              <a:rPr lang="en-US" dirty="0" err="1" smtClean="0"/>
-              <a:t>user.username</a:t>
-            </a:r>
-            <a:r>
-              <a:rPr lang="en-US" dirty="0" smtClean="0"/>
-              <a:t> = ""</a:t>
-            </a:r>
-          </a:p>
-          <a:p>
-            <a:pPr>
-              <a:buNone/>
-            </a:pPr>
-            <a:r>
-              <a:rPr lang="en-US" dirty="0" smtClean="0"/>
-              <a:t>    	assert !@</a:t>
-            </a:r>
-            <a:r>
-              <a:rPr lang="en-US" dirty="0" err="1" smtClean="0"/>
-              <a:t>user.save</a:t>
-            </a:r>
-            <a:r>
-              <a:rPr lang="en-US" dirty="0" smtClean="0"/>
-              <a:t>  </a:t>
-            </a:r>
-          </a:p>
-          <a:p>
-            <a:pPr>
-              <a:buNone/>
-            </a:pPr>
-            <a:r>
-              <a:rPr lang="en-US" dirty="0" smtClean="0"/>
-              <a:t>  end</a:t>
-            </a:r>
-          </a:p>
-          <a:p>
-            <a:pPr>
-              <a:buNone/>
-            </a:pPr>
-            <a:endParaRPr lang="en-US" dirty="0" smtClean="0"/>
-          </a:p>
-          <a:p>
-            <a:pPr>
-              <a:buNone/>
-            </a:pPr>
-            <a:r>
-              <a:rPr lang="en-US" dirty="0" smtClean="0"/>
-              <a:t>end</a:t>
-            </a:r>
-            <a:endParaRPr lang="en-CA" dirty="0"/>
+        <p:spPr/>
+        <p:txBody>
+          <a:bodyPr/>
+          <a:lstStyle/>
+          <a:p>
+            <a:endParaRPr lang="en-US"/>
           </a:p>
         </p:txBody>
       </p:sp>
@@ -5905,14 +5927,12 @@
           </a:ln>
         </p:spPr>
         <p:txBody>
-          <a:bodyPr>
-            <a:normAutofit/>
-          </a:bodyPr>
-          <a:lstStyle/>
-          <a:p>
-            <a:r>
-              <a:rPr lang="en-US" dirty="0" smtClean="0"/>
-              <a:t>Example User Acceptance Test</a:t>
+          <a:bodyPr/>
+          <a:lstStyle/>
+          <a:p>
+            <a:r>
+              <a:rPr lang="en-US" dirty="0" smtClean="0"/>
+              <a:t>Example: Ruby Code</a:t>
             </a:r>
             <a:endParaRPr lang="en-CA" dirty="0"/>
           </a:p>
@@ -5939,9 +5959,174 @@
           </a:ln>
         </p:spPr>
         <p:txBody>
-          <a:bodyPr/>
-          <a:lstStyle/>
-          <a:p>
+          <a:bodyPr>
+            <a:normAutofit fontScale="70000" lnSpcReduction="20000"/>
+          </a:bodyPr>
+          <a:lstStyle/>
+          <a:p>
+            <a:pPr>
+              <a:buNone/>
+            </a:pPr>
+            <a:r>
+              <a:rPr lang="en-US" dirty="0" smtClean="0"/>
+              <a:t>class Schedule &lt; </a:t>
+            </a:r>
+            <a:r>
+              <a:rPr lang="en-US" dirty="0" err="1" smtClean="0"/>
+              <a:t>ActiveRecord</a:t>
+            </a:r>
+            <a:r>
+              <a:rPr lang="en-US" dirty="0" smtClean="0"/>
+              <a:t>::Base</a:t>
+            </a:r>
+          </a:p>
+          <a:p>
+            <a:pPr>
+              <a:buNone/>
+            </a:pPr>
+            <a:r>
+              <a:rPr lang="en-US" dirty="0" smtClean="0"/>
+              <a:t>	</a:t>
+            </a:r>
+            <a:r>
+              <a:rPr lang="en-US" dirty="0" err="1" smtClean="0"/>
+              <a:t>belongs_to</a:t>
+            </a:r>
+            <a:r>
+              <a:rPr lang="en-US" dirty="0" smtClean="0"/>
+              <a:t> :user</a:t>
+            </a:r>
+          </a:p>
+          <a:p>
+            <a:pPr>
+              <a:buNone/>
+            </a:pPr>
+            <a:r>
+              <a:rPr lang="en-US" dirty="0" smtClean="0"/>
+              <a:t>	</a:t>
+            </a:r>
+            <a:r>
+              <a:rPr lang="en-US" dirty="0" err="1" smtClean="0"/>
+              <a:t>has_many</a:t>
+            </a:r>
+            <a:r>
+              <a:rPr lang="en-US" dirty="0" smtClean="0"/>
+              <a:t> :images</a:t>
+            </a:r>
+          </a:p>
+          <a:p>
+            <a:pPr>
+              <a:buNone/>
+            </a:pPr>
+            <a:r>
+              <a:rPr lang="en-US" dirty="0" smtClean="0"/>
+              <a:t>	</a:t>
+            </a:r>
+          </a:p>
+          <a:p>
+            <a:pPr>
+              <a:buNone/>
+            </a:pPr>
+            <a:r>
+              <a:rPr lang="en-US" dirty="0" smtClean="0"/>
+              <a:t>	# make sure schedule cannot be before present time</a:t>
+            </a:r>
+          </a:p>
+          <a:p>
+            <a:pPr>
+              <a:buNone/>
+            </a:pPr>
+            <a:r>
+              <a:rPr lang="en-US" dirty="0" smtClean="0"/>
+              <a:t>	</a:t>
+            </a:r>
+            <a:r>
+              <a:rPr lang="en-US" dirty="0" err="1" smtClean="0"/>
+              <a:t>validates_datetime</a:t>
+            </a:r>
+            <a:r>
+              <a:rPr lang="en-US" dirty="0" smtClean="0"/>
+              <a:t> :</a:t>
+            </a:r>
+            <a:r>
+              <a:rPr lang="en-US" dirty="0" err="1" smtClean="0"/>
+              <a:t>start_time</a:t>
+            </a:r>
+            <a:r>
+              <a:rPr lang="en-US" dirty="0" smtClean="0"/>
+              <a:t>, :after =&gt; lambda { </a:t>
+            </a:r>
+            <a:r>
+              <a:rPr lang="en-US" dirty="0" err="1" smtClean="0"/>
+              <a:t>Time.now</a:t>
+            </a:r>
+            <a:r>
+              <a:rPr lang="en-US" dirty="0" smtClean="0"/>
+              <a:t> }, :</a:t>
+            </a:r>
+            <a:r>
+              <a:rPr lang="en-US" dirty="0" err="1" smtClean="0"/>
+              <a:t>after_message</a:t>
+            </a:r>
+            <a:r>
+              <a:rPr lang="en-US" dirty="0" smtClean="0"/>
+              <a:t> =&gt; "must be in the future"</a:t>
+            </a:r>
+          </a:p>
+          <a:p>
+            <a:pPr>
+              <a:buNone/>
+            </a:pPr>
+            <a:r>
+              <a:rPr lang="en-US" dirty="0" smtClean="0"/>
+              <a:t>	</a:t>
+            </a:r>
+          </a:p>
+          <a:p>
+            <a:pPr>
+              <a:buNone/>
+            </a:pPr>
+            <a:r>
+              <a:rPr lang="en-US" dirty="0" smtClean="0"/>
+              <a:t>	# make some fields required</a:t>
+            </a:r>
+          </a:p>
+          <a:p>
+            <a:pPr>
+              <a:buNone/>
+            </a:pPr>
+            <a:r>
+              <a:rPr lang="en-US" dirty="0" smtClean="0"/>
+              <a:t>	</a:t>
+            </a:r>
+            <a:r>
+              <a:rPr lang="en-US" dirty="0" err="1" smtClean="0"/>
+              <a:t>validates_presence_of</a:t>
+            </a:r>
+            <a:r>
+              <a:rPr lang="en-US" dirty="0" smtClean="0"/>
+              <a:t> :exposure, :declination, :</a:t>
+            </a:r>
+            <a:r>
+              <a:rPr lang="en-US" dirty="0" err="1" smtClean="0"/>
+              <a:t>right_ascension</a:t>
+            </a:r>
+            <a:endParaRPr lang="en-US" dirty="0" smtClean="0"/>
+          </a:p>
+          <a:p>
+            <a:pPr>
+              <a:buNone/>
+            </a:pPr>
+            <a:endParaRPr lang="en-US" dirty="0" smtClean="0"/>
+          </a:p>
+          <a:p>
+            <a:pPr>
+              <a:buNone/>
+            </a:pPr>
+            <a:r>
+              <a:rPr lang="en-US" dirty="0" smtClean="0"/>
+              <a:t>end</a:t>
+            </a:r>
             <a:endParaRPr lang="en-CA" dirty="0"/>
           </a:p>
         </p:txBody>
@@ -5997,7 +6182,7 @@
           <a:p>
             <a:r>
               <a:rPr lang="en-US" dirty="0" smtClean="0"/>
-              <a:t>Project Timeline</a:t>
+              <a:t>Testing</a:t>
             </a:r>
             <a:endParaRPr lang="en-CA" dirty="0"/>
           </a:p>
@@ -6024,53 +6209,41 @@
           </a:ln>
         </p:spPr>
         <p:txBody>
-          <a:bodyPr/>
-          <a:lstStyle/>
-          <a:p>
-            <a:r>
-              <a:rPr lang="en-US" dirty="0" smtClean="0"/>
-              <a:t>Iteration 1: Inception</a:t>
-            </a:r>
-          </a:p>
-          <a:p>
-            <a:r>
-              <a:rPr lang="en-US" dirty="0" smtClean="0"/>
-              <a:t>Iteration 2: SPIKE project</a:t>
-            </a:r>
-          </a:p>
-          <a:p>
-            <a:r>
-              <a:rPr lang="en-US" dirty="0" smtClean="0"/>
-              <a:t>Iteration 3: Release #1</a:t>
-            </a:r>
-          </a:p>
-          <a:p>
-            <a:r>
-              <a:rPr lang="en-US" dirty="0" smtClean="0"/>
-              <a:t>Iteration 4: Release #2</a:t>
-            </a:r>
-          </a:p>
-          <a:p>
-            <a:r>
-              <a:rPr lang="en-US" dirty="0" smtClean="0"/>
-              <a:t>Iteration 5: Final </a:t>
-            </a:r>
-            <a:r>
-              <a:rPr lang="en-US" dirty="0" err="1" smtClean="0"/>
-              <a:t>Refactored</a:t>
-            </a:r>
-            <a:r>
-              <a:rPr lang="en-US" dirty="0" smtClean="0"/>
-              <a:t> Release</a:t>
-            </a:r>
-          </a:p>
-          <a:p>
-            <a:endParaRPr lang="en-US" dirty="0" smtClean="0"/>
-          </a:p>
-          <a:p>
-            <a:r>
-              <a:rPr lang="en-US" dirty="0" smtClean="0"/>
-              <a:t>Each iteration = ~1 week</a:t>
+          <a:bodyPr>
+            <a:normAutofit/>
+          </a:bodyPr>
+          <a:lstStyle/>
+          <a:p>
+            <a:r>
+              <a:rPr lang="en-US" dirty="0" smtClean="0"/>
+              <a:t>Unit tests:</a:t>
+            </a:r>
+          </a:p>
+          <a:p>
+            <a:pPr lvl="1"/>
+            <a:r>
+              <a:rPr lang="en-US" dirty="0" smtClean="0"/>
+              <a:t>“Black box” tests to ensure functionality correctness. A test suite is used to run all unit tests whenever new code is added to the system</a:t>
+            </a:r>
+          </a:p>
+          <a:p>
+            <a:pPr lvl="1"/>
+            <a:r>
+              <a:rPr lang="en-US" dirty="0" smtClean="0"/>
+              <a:t>All tests must pass after the new code is added</a:t>
+            </a:r>
+          </a:p>
+          <a:p>
+            <a:r>
+              <a:rPr lang="en-US" dirty="0" smtClean="0"/>
+              <a:t>Acceptance tests:</a:t>
+            </a:r>
+          </a:p>
+          <a:p>
+            <a:pPr lvl="1"/>
+            <a:r>
+              <a:rPr lang="en-US" dirty="0" smtClean="0"/>
+              <a:t>“White box” tests used to ensure business “fit” of the system</a:t>
             </a:r>
             <a:endParaRPr lang="en-CA" dirty="0"/>
           </a:p>
@@ -6229,6 +6402,481 @@
 </file>
 
 <file path=ppt/slides/slide20.xml><?xml version="1.0" encoding="utf-8"?>
+<p:sld xmlns:a="http://schemas.openxmlformats.org/drawingml/2006/main" xmlns:r="http://schemas.openxmlformats.org/officeDocument/2006/relationships" xmlns:p="http://schemas.openxmlformats.org/presentationml/2006/main">
+  <p:cSld>
+    <p:spTree>
+      <p:nvGrpSpPr>
+        <p:cNvPr id="1" name=""/>
+        <p:cNvGrpSpPr/>
+        <p:nvPr/>
+      </p:nvGrpSpPr>
+      <p:grpSpPr>
+        <a:xfrm>
+          <a:off x="0" y="0"/>
+          <a:ext cx="0" cy="0"/>
+          <a:chOff x="0" y="0"/>
+          <a:chExt cx="0" cy="0"/>
+        </a:xfrm>
+      </p:grpSpPr>
+      <p:sp>
+        <p:nvSpPr>
+          <p:cNvPr id="2" name="Title 1"/>
+          <p:cNvSpPr>
+            <a:spLocks noGrp="1"/>
+          </p:cNvSpPr>
+          <p:nvPr>
+            <p:ph type="title"/>
+          </p:nvPr>
+        </p:nvSpPr>
+        <p:spPr>
+          <a:solidFill>
+            <a:srgbClr val="000000"/>
+          </a:solidFill>
+          <a:ln>
+            <a:solidFill>
+              <a:schemeClr val="accent1"/>
+            </a:solidFill>
+          </a:ln>
+        </p:spPr>
+        <p:txBody>
+          <a:bodyPr/>
+          <a:lstStyle/>
+          <a:p>
+            <a:r>
+              <a:rPr lang="en-US" dirty="0" smtClean="0"/>
+              <a:t>Example: Unit Test + Demo</a:t>
+            </a:r>
+            <a:endParaRPr lang="en-CA" dirty="0"/>
+          </a:p>
+        </p:txBody>
+      </p:sp>
+      <p:sp>
+        <p:nvSpPr>
+          <p:cNvPr id="3" name="Content Placeholder 2"/>
+          <p:cNvSpPr>
+            <a:spLocks noGrp="1"/>
+          </p:cNvSpPr>
+          <p:nvPr>
+            <p:ph idx="1"/>
+          </p:nvPr>
+        </p:nvSpPr>
+        <p:spPr>
+          <a:solidFill>
+            <a:srgbClr val="000000"/>
+          </a:solidFill>
+          <a:ln>
+            <a:solidFill>
+              <a:schemeClr val="accent1"/>
+            </a:solidFill>
+          </a:ln>
+        </p:spPr>
+        <p:txBody>
+          <a:bodyPr>
+            <a:normAutofit fontScale="47500" lnSpcReduction="20000"/>
+          </a:bodyPr>
+          <a:lstStyle/>
+          <a:p>
+            <a:pPr>
+              <a:buNone/>
+            </a:pPr>
+            <a:r>
+              <a:rPr lang="en-US" dirty="0" smtClean="0"/>
+              <a:t>require '</a:t>
+            </a:r>
+            <a:r>
+              <a:rPr lang="en-US" dirty="0" err="1" smtClean="0"/>
+              <a:t>test_helper</a:t>
+            </a:r>
+            <a:r>
+              <a:rPr lang="en-US" dirty="0" smtClean="0"/>
+              <a:t>'</a:t>
+            </a:r>
+          </a:p>
+          <a:p>
+            <a:pPr>
+              <a:buNone/>
+            </a:pPr>
+            <a:endParaRPr lang="en-US" dirty="0" smtClean="0"/>
+          </a:p>
+          <a:p>
+            <a:pPr>
+              <a:buNone/>
+            </a:pPr>
+            <a:r>
+              <a:rPr lang="en-US" dirty="0" smtClean="0"/>
+              <a:t>class </a:t>
+            </a:r>
+            <a:r>
+              <a:rPr lang="en-US" dirty="0" err="1" smtClean="0"/>
+              <a:t>UserTest</a:t>
+            </a:r>
+            <a:r>
+              <a:rPr lang="en-US" dirty="0" smtClean="0"/>
+              <a:t> &lt; </a:t>
+            </a:r>
+            <a:r>
+              <a:rPr lang="en-US" dirty="0" err="1" smtClean="0"/>
+              <a:t>ActiveSupport</a:t>
+            </a:r>
+            <a:r>
+              <a:rPr lang="en-US" dirty="0" smtClean="0"/>
+              <a:t>::</a:t>
+            </a:r>
+            <a:r>
+              <a:rPr lang="en-US" dirty="0" err="1" smtClean="0"/>
+              <a:t>TestCase</a:t>
+            </a:r>
+            <a:endParaRPr lang="en-US" dirty="0" smtClean="0"/>
+          </a:p>
+          <a:p>
+            <a:pPr>
+              <a:buNone/>
+            </a:pPr>
+            <a:r>
+              <a:rPr lang="en-US" dirty="0" smtClean="0"/>
+              <a:t>	</a:t>
+            </a:r>
+          </a:p>
+          <a:p>
+            <a:pPr>
+              <a:buNone/>
+            </a:pPr>
+            <a:r>
+              <a:rPr lang="en-US" dirty="0" smtClean="0"/>
+              <a:t>  # create a user with necessary, correct input values for the following tests</a:t>
+            </a:r>
+          </a:p>
+          <a:p>
+            <a:pPr>
+              <a:buNone/>
+            </a:pPr>
+            <a:r>
+              <a:rPr lang="en-US" dirty="0" smtClean="0"/>
+              <a:t>  def setup</a:t>
+            </a:r>
+          </a:p>
+          <a:p>
+            <a:pPr>
+              <a:buNone/>
+            </a:pPr>
+            <a:r>
+              <a:rPr lang="en-US" dirty="0" smtClean="0"/>
+              <a:t>  	@user = </a:t>
+            </a:r>
+            <a:r>
+              <a:rPr lang="en-US" dirty="0" err="1" smtClean="0"/>
+              <a:t>User.new</a:t>
+            </a:r>
+            <a:endParaRPr lang="en-US" dirty="0" smtClean="0"/>
+          </a:p>
+          <a:p>
+            <a:pPr>
+              <a:buNone/>
+            </a:pPr>
+            <a:r>
+              <a:rPr lang="en-US" dirty="0" smtClean="0"/>
+              <a:t>  	@</a:t>
+            </a:r>
+            <a:r>
+              <a:rPr lang="en-US" dirty="0" err="1" smtClean="0"/>
+              <a:t>user.username</a:t>
+            </a:r>
+            <a:r>
+              <a:rPr lang="en-US" dirty="0" smtClean="0"/>
+              <a:t> = "</a:t>
+            </a:r>
+            <a:r>
+              <a:rPr lang="en-US" dirty="0" err="1" smtClean="0"/>
+              <a:t>unit_test</a:t>
+            </a:r>
+            <a:r>
+              <a:rPr lang="en-US" dirty="0" smtClean="0"/>
+              <a:t>"</a:t>
+            </a:r>
+          </a:p>
+          <a:p>
+            <a:pPr>
+              <a:buNone/>
+            </a:pPr>
+            <a:r>
+              <a:rPr lang="en-US" dirty="0" smtClean="0"/>
+              <a:t>  	@</a:t>
+            </a:r>
+            <a:r>
+              <a:rPr lang="en-US" dirty="0" err="1" smtClean="0"/>
+              <a:t>user.email</a:t>
+            </a:r>
+            <a:r>
+              <a:rPr lang="en-US" dirty="0" smtClean="0"/>
+              <a:t> = "unit@test.com"</a:t>
+            </a:r>
+          </a:p>
+          <a:p>
+            <a:pPr>
+              <a:buNone/>
+            </a:pPr>
+            <a:r>
+              <a:rPr lang="en-US" dirty="0" smtClean="0"/>
+              <a:t>    	@</a:t>
+            </a:r>
+            <a:r>
+              <a:rPr lang="en-US" dirty="0" err="1" smtClean="0"/>
+              <a:t>user.password</a:t>
+            </a:r>
+            <a:r>
+              <a:rPr lang="en-US" dirty="0" smtClean="0"/>
+              <a:t> = "test"</a:t>
+            </a:r>
+          </a:p>
+          <a:p>
+            <a:pPr>
+              <a:buNone/>
+            </a:pPr>
+            <a:r>
+              <a:rPr lang="en-US" dirty="0" smtClean="0"/>
+              <a:t>    	@</a:t>
+            </a:r>
+            <a:r>
+              <a:rPr lang="en-US" dirty="0" err="1" smtClean="0"/>
+              <a:t>user.password_confirmation</a:t>
+            </a:r>
+            <a:r>
+              <a:rPr lang="en-US" dirty="0" smtClean="0"/>
+              <a:t> = "test"</a:t>
+            </a:r>
+          </a:p>
+          <a:p>
+            <a:pPr>
+              <a:buNone/>
+            </a:pPr>
+            <a:r>
+              <a:rPr lang="en-US" dirty="0" smtClean="0"/>
+              <a:t>  end</a:t>
+            </a:r>
+          </a:p>
+          <a:p>
+            <a:pPr>
+              <a:buNone/>
+            </a:pPr>
+            <a:r>
+              <a:rPr lang="en-US" dirty="0" smtClean="0"/>
+              <a:t>  </a:t>
+            </a:r>
+          </a:p>
+          <a:p>
+            <a:pPr>
+              <a:buNone/>
+            </a:pPr>
+            <a:r>
+              <a:rPr lang="en-US" dirty="0" smtClean="0"/>
+              <a:t>  def </a:t>
+            </a:r>
+            <a:r>
+              <a:rPr lang="en-US" dirty="0" err="1" smtClean="0"/>
+              <a:t>test_username_cannot_be_null</a:t>
+            </a:r>
+            <a:endParaRPr lang="en-US" dirty="0" smtClean="0"/>
+          </a:p>
+          <a:p>
+            <a:pPr>
+              <a:buNone/>
+            </a:pPr>
+            <a:r>
+              <a:rPr lang="en-US" dirty="0" smtClean="0"/>
+              <a:t>    	@</a:t>
+            </a:r>
+            <a:r>
+              <a:rPr lang="en-US" dirty="0" err="1" smtClean="0"/>
+              <a:t>user.username</a:t>
+            </a:r>
+            <a:r>
+              <a:rPr lang="en-US" dirty="0" smtClean="0"/>
+              <a:t> = ""</a:t>
+            </a:r>
+          </a:p>
+          <a:p>
+            <a:pPr>
+              <a:buNone/>
+            </a:pPr>
+            <a:r>
+              <a:rPr lang="en-US" dirty="0" smtClean="0"/>
+              <a:t>    	assert !@</a:t>
+            </a:r>
+            <a:r>
+              <a:rPr lang="en-US" dirty="0" err="1" smtClean="0"/>
+              <a:t>user.save</a:t>
+            </a:r>
+            <a:r>
+              <a:rPr lang="en-US" dirty="0" smtClean="0"/>
+              <a:t>  </a:t>
+            </a:r>
+          </a:p>
+          <a:p>
+            <a:pPr>
+              <a:buNone/>
+            </a:pPr>
+            <a:r>
+              <a:rPr lang="en-US" dirty="0" smtClean="0"/>
+              <a:t>  end</a:t>
+            </a:r>
+          </a:p>
+          <a:p>
+            <a:pPr>
+              <a:buNone/>
+            </a:pPr>
+            <a:endParaRPr lang="en-US" dirty="0" smtClean="0"/>
+          </a:p>
+          <a:p>
+            <a:pPr>
+              <a:buNone/>
+            </a:pPr>
+            <a:r>
+              <a:rPr lang="en-US" dirty="0" smtClean="0"/>
+              <a:t>end</a:t>
+            </a:r>
+            <a:endParaRPr lang="en-CA" dirty="0"/>
+          </a:p>
+        </p:txBody>
+      </p:sp>
+    </p:spTree>
+  </p:cSld>
+  <p:clrMapOvr>
+    <a:masterClrMapping/>
+  </p:clrMapOvr>
+</p:sld>
+</file>
+
+<file path=ppt/slides/slide21.xml><?xml version="1.0" encoding="utf-8"?>
+<p:sld xmlns:a="http://schemas.openxmlformats.org/drawingml/2006/main" xmlns:r="http://schemas.openxmlformats.org/officeDocument/2006/relationships" xmlns:p="http://schemas.openxmlformats.org/presentationml/2006/main">
+  <p:cSld>
+    <p:spTree>
+      <p:nvGrpSpPr>
+        <p:cNvPr id="1" name=""/>
+        <p:cNvGrpSpPr/>
+        <p:nvPr/>
+      </p:nvGrpSpPr>
+      <p:grpSpPr>
+        <a:xfrm>
+          <a:off x="0" y="0"/>
+          <a:ext cx="0" cy="0"/>
+          <a:chOff x="0" y="0"/>
+          <a:chExt cx="0" cy="0"/>
+        </a:xfrm>
+      </p:grpSpPr>
+      <p:sp>
+        <p:nvSpPr>
+          <p:cNvPr id="2" name="Title 1"/>
+          <p:cNvSpPr>
+            <a:spLocks noGrp="1"/>
+          </p:cNvSpPr>
+          <p:nvPr>
+            <p:ph type="title"/>
+          </p:nvPr>
+        </p:nvSpPr>
+        <p:spPr>
+          <a:solidFill>
+            <a:srgbClr val="000000"/>
+          </a:solidFill>
+          <a:ln>
+            <a:solidFill>
+              <a:schemeClr val="accent1"/>
+            </a:solidFill>
+          </a:ln>
+        </p:spPr>
+        <p:txBody>
+          <a:bodyPr/>
+          <a:lstStyle/>
+          <a:p>
+            <a:r>
+              <a:rPr lang="en-US" dirty="0" smtClean="0"/>
+              <a:t>Project Timeline</a:t>
+            </a:r>
+            <a:endParaRPr lang="en-CA" dirty="0"/>
+          </a:p>
+        </p:txBody>
+      </p:sp>
+      <p:sp>
+        <p:nvSpPr>
+          <p:cNvPr id="3" name="Content Placeholder 2"/>
+          <p:cNvSpPr>
+            <a:spLocks noGrp="1"/>
+          </p:cNvSpPr>
+          <p:nvPr>
+            <p:ph idx="1"/>
+          </p:nvPr>
+        </p:nvSpPr>
+        <p:spPr>
+          <a:solidFill>
+            <a:srgbClr val="000000"/>
+          </a:solidFill>
+          <a:ln>
+            <a:solidFill>
+              <a:schemeClr val="accent1"/>
+            </a:solidFill>
+          </a:ln>
+        </p:spPr>
+        <p:txBody>
+          <a:bodyPr/>
+          <a:lstStyle/>
+          <a:p>
+            <a:r>
+              <a:rPr lang="en-US" dirty="0" smtClean="0"/>
+              <a:t>Iteration 1: Inception</a:t>
+            </a:r>
+          </a:p>
+          <a:p>
+            <a:r>
+              <a:rPr lang="en-US" dirty="0" smtClean="0"/>
+              <a:t>Iteration 2: SPIKE project</a:t>
+            </a:r>
+          </a:p>
+          <a:p>
+            <a:r>
+              <a:rPr lang="en-US" dirty="0" smtClean="0"/>
+              <a:t>Iteration 3: Release #1</a:t>
+            </a:r>
+          </a:p>
+          <a:p>
+            <a:r>
+              <a:rPr lang="en-US" dirty="0" smtClean="0"/>
+              <a:t>Iteration 4: Release #2</a:t>
+            </a:r>
+          </a:p>
+          <a:p>
+            <a:r>
+              <a:rPr lang="en-US" dirty="0" smtClean="0"/>
+              <a:t>Iteration 5: Final </a:t>
+            </a:r>
+            <a:r>
+              <a:rPr lang="en-US" dirty="0" err="1" smtClean="0"/>
+              <a:t>Refactored</a:t>
+            </a:r>
+            <a:r>
+              <a:rPr lang="en-US" dirty="0" smtClean="0"/>
+              <a:t> Release</a:t>
+            </a:r>
+          </a:p>
+          <a:p>
+            <a:endParaRPr lang="en-US" dirty="0" smtClean="0"/>
+          </a:p>
+          <a:p>
+            <a:r>
+              <a:rPr lang="en-US" dirty="0" smtClean="0"/>
+              <a:t>Each iteration = ~1 week</a:t>
+            </a:r>
+            <a:endParaRPr lang="en-CA" dirty="0"/>
+          </a:p>
+        </p:txBody>
+      </p:sp>
+    </p:spTree>
+  </p:cSld>
+  <p:clrMapOvr>
+    <a:masterClrMapping/>
+  </p:clrMapOvr>
+</p:sld>
+</file>
+
+<file path=ppt/slides/slide22.xml><?xml version="1.0" encoding="utf-8"?>
 <p:sld xmlns:a="http://schemas.openxmlformats.org/drawingml/2006/main" xmlns:r="http://schemas.openxmlformats.org/officeDocument/2006/relationships" xmlns:p="http://schemas.openxmlformats.org/presentationml/2006/main">
   <p:cSld>
     <p:spTree>
@@ -7867,295 +8515,6 @@
 </p:sld>
 </file>
 
-<file path=ppt/slides/slide21.xml><?xml version="1.0" encoding="utf-8"?>
-<p:sld xmlns:a="http://schemas.openxmlformats.org/drawingml/2006/main" xmlns:r="http://schemas.openxmlformats.org/officeDocument/2006/relationships" xmlns:p="http://schemas.openxmlformats.org/presentationml/2006/main">
-  <p:cSld>
-    <p:spTree>
-      <p:nvGrpSpPr>
-        <p:cNvPr id="1" name=""/>
-        <p:cNvGrpSpPr/>
-        <p:nvPr/>
-      </p:nvGrpSpPr>
-      <p:grpSpPr>
-        <a:xfrm>
-          <a:off x="0" y="0"/>
-          <a:ext cx="0" cy="0"/>
-          <a:chOff x="0" y="0"/>
-          <a:chExt cx="0" cy="0"/>
-        </a:xfrm>
-      </p:grpSpPr>
-      <p:sp>
-        <p:nvSpPr>
-          <p:cNvPr id="2" name="Title 1"/>
-          <p:cNvSpPr>
-            <a:spLocks noGrp="1"/>
-          </p:cNvSpPr>
-          <p:nvPr>
-            <p:ph type="title"/>
-          </p:nvPr>
-        </p:nvSpPr>
-        <p:spPr>
-          <a:solidFill>
-            <a:srgbClr val="000000"/>
-          </a:solidFill>
-          <a:ln>
-            <a:solidFill>
-              <a:schemeClr val="accent1"/>
-            </a:solidFill>
-          </a:ln>
-        </p:spPr>
-        <p:txBody>
-          <a:bodyPr/>
-          <a:lstStyle/>
-          <a:p>
-            <a:r>
-              <a:rPr lang="en-US" dirty="0" smtClean="0"/>
-              <a:t>Project Evaluation and Metrics</a:t>
-            </a:r>
-            <a:endParaRPr lang="en-CA" dirty="0"/>
-          </a:p>
-        </p:txBody>
-      </p:sp>
-      <p:sp>
-        <p:nvSpPr>
-          <p:cNvPr id="3" name="Content Placeholder 2"/>
-          <p:cNvSpPr>
-            <a:spLocks noGrp="1"/>
-          </p:cNvSpPr>
-          <p:nvPr>
-            <p:ph idx="1"/>
-          </p:nvPr>
-        </p:nvSpPr>
-        <p:spPr>
-          <a:solidFill>
-            <a:srgbClr val="000000"/>
-          </a:solidFill>
-          <a:ln>
-            <a:solidFill>
-              <a:schemeClr val="accent1"/>
-            </a:solidFill>
-          </a:ln>
-        </p:spPr>
-        <p:txBody>
-          <a:bodyPr>
-            <a:normAutofit fontScale="85000" lnSpcReduction="20000"/>
-          </a:bodyPr>
-          <a:lstStyle/>
-          <a:p>
-            <a:r>
-              <a:rPr lang="en-US" dirty="0" smtClean="0"/>
-              <a:t>Time spent: (1 unit = 15 minutes)</a:t>
-            </a:r>
-          </a:p>
-          <a:p>
-            <a:r>
-              <a:rPr lang="en-US" dirty="0" smtClean="0"/>
-              <a:t>Total time: </a:t>
-            </a:r>
-          </a:p>
-          <a:p>
-            <a:endParaRPr lang="en-US" dirty="0"/>
-          </a:p>
-          <a:p>
-            <a:r>
-              <a:rPr lang="en-US" dirty="0" smtClean="0"/>
-              <a:t>Coding:</a:t>
-            </a:r>
-          </a:p>
-          <a:p>
-            <a:pPr lvl="1"/>
-            <a:r>
-              <a:rPr lang="en-US" dirty="0" smtClean="0"/>
-              <a:t>Models: 4</a:t>
-            </a:r>
-          </a:p>
-          <a:p>
-            <a:pPr lvl="1"/>
-            <a:r>
-              <a:rPr lang="en-US" dirty="0" smtClean="0"/>
-              <a:t>Views:  26</a:t>
-            </a:r>
-          </a:p>
-          <a:p>
-            <a:pPr lvl="1"/>
-            <a:r>
-              <a:rPr lang="en-US" dirty="0" smtClean="0"/>
-              <a:t>Controllers: 6</a:t>
-            </a:r>
-            <a:endParaRPr lang="en-US" dirty="0"/>
-          </a:p>
-          <a:p>
-            <a:r>
-              <a:rPr lang="en-US" dirty="0" smtClean="0"/>
-              <a:t>Tests:</a:t>
-            </a:r>
-          </a:p>
-          <a:p>
-            <a:pPr lvl="1"/>
-            <a:r>
-              <a:rPr lang="en-US" dirty="0" smtClean="0"/>
-              <a:t>Unit tests: 3</a:t>
-            </a:r>
-          </a:p>
-          <a:p>
-            <a:pPr lvl="1"/>
-            <a:r>
-              <a:rPr lang="en-US" dirty="0" smtClean="0"/>
-              <a:t>Test cases: 17</a:t>
-            </a:r>
-          </a:p>
-          <a:p>
-            <a:pPr lvl="1"/>
-            <a:r>
-              <a:rPr lang="en-US" dirty="0" smtClean="0"/>
-              <a:t>Assertions: 29</a:t>
-            </a:r>
-          </a:p>
-          <a:p>
-            <a:endParaRPr lang="en-US" dirty="0"/>
-          </a:p>
-          <a:p>
-            <a:endParaRPr lang="en-CA" dirty="0"/>
-          </a:p>
-        </p:txBody>
-      </p:sp>
-    </p:spTree>
-  </p:cSld>
-  <p:clrMapOvr>
-    <a:masterClrMapping/>
-  </p:clrMapOvr>
-</p:sld>
-</file>
-
-<file path=ppt/slides/slide22.xml><?xml version="1.0" encoding="utf-8"?>
-<p:sld xmlns:a="http://schemas.openxmlformats.org/drawingml/2006/main" xmlns:r="http://schemas.openxmlformats.org/officeDocument/2006/relationships" xmlns:p="http://schemas.openxmlformats.org/presentationml/2006/main">
-  <p:cSld>
-    <p:spTree>
-      <p:nvGrpSpPr>
-        <p:cNvPr id="1" name=""/>
-        <p:cNvGrpSpPr/>
-        <p:nvPr/>
-      </p:nvGrpSpPr>
-      <p:grpSpPr>
-        <a:xfrm>
-          <a:off x="0" y="0"/>
-          <a:ext cx="0" cy="0"/>
-          <a:chOff x="0" y="0"/>
-          <a:chExt cx="0" cy="0"/>
-        </a:xfrm>
-      </p:grpSpPr>
-      <p:sp>
-        <p:nvSpPr>
-          <p:cNvPr id="2" name="Title 1"/>
-          <p:cNvSpPr>
-            <a:spLocks noGrp="1"/>
-          </p:cNvSpPr>
-          <p:nvPr>
-            <p:ph type="title"/>
-          </p:nvPr>
-        </p:nvSpPr>
-        <p:spPr>
-          <a:solidFill>
-            <a:srgbClr val="000000"/>
-          </a:solidFill>
-          <a:ln>
-            <a:solidFill>
-              <a:schemeClr val="accent1"/>
-            </a:solidFill>
-          </a:ln>
-        </p:spPr>
-        <p:txBody>
-          <a:bodyPr/>
-          <a:lstStyle/>
-          <a:p>
-            <a:r>
-              <a:rPr lang="en-US" dirty="0" smtClean="0"/>
-              <a:t>What did we learn?</a:t>
-            </a:r>
-            <a:endParaRPr lang="en-CA" dirty="0"/>
-          </a:p>
-        </p:txBody>
-      </p:sp>
-      <p:sp>
-        <p:nvSpPr>
-          <p:cNvPr id="3" name="Content Placeholder 2"/>
-          <p:cNvSpPr>
-            <a:spLocks noGrp="1"/>
-          </p:cNvSpPr>
-          <p:nvPr>
-            <p:ph idx="1"/>
-          </p:nvPr>
-        </p:nvSpPr>
-        <p:spPr>
-          <a:solidFill>
-            <a:srgbClr val="000000"/>
-          </a:solidFill>
-          <a:ln>
-            <a:solidFill>
-              <a:schemeClr val="accent1"/>
-            </a:solidFill>
-          </a:ln>
-        </p:spPr>
-        <p:txBody>
-          <a:bodyPr/>
-          <a:lstStyle/>
-          <a:p>
-            <a:r>
-              <a:rPr lang="en-US" dirty="0" smtClean="0"/>
-              <a:t>New methodology: </a:t>
-            </a:r>
-            <a:r>
-              <a:rPr lang="en-US" dirty="0" err="1" smtClean="0"/>
-              <a:t>Xtreme</a:t>
-            </a:r>
-            <a:r>
-              <a:rPr lang="en-US" dirty="0" smtClean="0"/>
-              <a:t> Programming</a:t>
-            </a:r>
-          </a:p>
-          <a:p>
-            <a:pPr lvl="1"/>
-            <a:r>
-              <a:rPr lang="en-US" dirty="0" smtClean="0"/>
-              <a:t>Pair programming</a:t>
-            </a:r>
-          </a:p>
-          <a:p>
-            <a:r>
-              <a:rPr lang="en-US" dirty="0" smtClean="0"/>
-              <a:t>New framework: Ruby on Rails</a:t>
-            </a:r>
-          </a:p>
-          <a:p>
-            <a:r>
-              <a:rPr lang="en-US" dirty="0" smtClean="0"/>
-              <a:t>New language: Ruby</a:t>
-            </a:r>
-          </a:p>
-          <a:p>
-            <a:r>
-              <a:rPr lang="en-US" dirty="0" smtClean="0"/>
-              <a:t>New versioning tool: </a:t>
-            </a:r>
-            <a:r>
-              <a:rPr lang="en-US" dirty="0" err="1" smtClean="0"/>
-              <a:t>Git</a:t>
-            </a:r>
-            <a:endParaRPr lang="en-US" dirty="0" smtClean="0"/>
-          </a:p>
-          <a:p>
-            <a:endParaRPr lang="en-CA" dirty="0"/>
-          </a:p>
-        </p:txBody>
-      </p:sp>
-    </p:spTree>
-  </p:cSld>
-  <p:clrMapOvr>
-    <a:masterClrMapping/>
-  </p:clrMapOvr>
-</p:sld>
-</file>
-
 <file path=ppt/slides/slide23.xml><?xml version="1.0" encoding="utf-8"?>
 <p:sld xmlns:a="http://schemas.openxmlformats.org/drawingml/2006/main" xmlns:r="http://schemas.openxmlformats.org/officeDocument/2006/relationships" xmlns:p="http://schemas.openxmlformats.org/presentationml/2006/main">
   <p:cSld>
@@ -8199,7 +8558,7 @@
           <a:p>
             <a:r>
               <a:rPr lang="en-US" dirty="0" smtClean="0"/>
-              <a:t>Issues and Project Difficulties</a:t>
+              <a:t>Project Evaluation and Metrics</a:t>
             </a:r>
             <a:endParaRPr lang="en-CA" dirty="0"/>
           </a:p>
@@ -8226,26 +8585,84 @@
           </a:ln>
         </p:spPr>
         <p:txBody>
-          <a:bodyPr/>
-          <a:lstStyle/>
-          <a:p>
-            <a:r>
-              <a:rPr lang="en-US" dirty="0" smtClean="0"/>
-              <a:t>Needed additional time to learn new framework and language</a:t>
-            </a:r>
-          </a:p>
-          <a:p>
-            <a:r>
-              <a:rPr lang="en-US" dirty="0" smtClean="0"/>
-              <a:t>Difficulties contacting customers and getting user input</a:t>
-            </a:r>
+          <a:bodyPr>
+            <a:normAutofit fontScale="85000" lnSpcReduction="20000"/>
+          </a:bodyPr>
+          <a:lstStyle/>
+          <a:p>
+            <a:r>
+              <a:rPr lang="en-US" dirty="0" smtClean="0"/>
+              <a:t>Time spent: (1 unit = 15 minutes)</a:t>
+            </a:r>
+          </a:p>
+          <a:p>
+            <a:r>
+              <a:rPr lang="en-US" dirty="0" smtClean="0"/>
+              <a:t>Total time: </a:t>
+            </a:r>
+          </a:p>
+          <a:p>
             <a:endParaRPr lang="en-US" dirty="0"/>
           </a:p>
           <a:p>
             <a:r>
               <a:rPr lang="en-US" dirty="0" smtClean="0"/>
-              <a:t>Technological difficulties: trouble communicating with telescope through Java programs</a:t>
-            </a:r>
+              <a:t>Coding:</a:t>
+            </a:r>
+          </a:p>
+          <a:p>
+            <a:pPr lvl="1"/>
+            <a:r>
+              <a:rPr lang="en-US" dirty="0" smtClean="0"/>
+              <a:t>Models: 4</a:t>
+            </a:r>
+          </a:p>
+          <a:p>
+            <a:pPr lvl="1"/>
+            <a:r>
+              <a:rPr lang="en-US" dirty="0" smtClean="0"/>
+              <a:t>Views:  26</a:t>
+            </a:r>
+          </a:p>
+          <a:p>
+            <a:pPr lvl="1"/>
+            <a:r>
+              <a:rPr lang="en-US" dirty="0" smtClean="0"/>
+              <a:t>Controllers: 6</a:t>
+            </a:r>
+            <a:endParaRPr lang="en-US" dirty="0"/>
+          </a:p>
+          <a:p>
+            <a:r>
+              <a:rPr lang="en-US" dirty="0" smtClean="0"/>
+              <a:t>Tests:</a:t>
+            </a:r>
+          </a:p>
+          <a:p>
+            <a:pPr lvl="1"/>
+            <a:r>
+              <a:rPr lang="en-US" dirty="0" smtClean="0"/>
+              <a:t>Unit tests: 3</a:t>
+            </a:r>
+          </a:p>
+          <a:p>
+            <a:pPr lvl="1"/>
+            <a:r>
+              <a:rPr lang="en-US" dirty="0" smtClean="0"/>
+              <a:t>Test cases: 17</a:t>
+            </a:r>
+          </a:p>
+          <a:p>
+            <a:pPr lvl="1"/>
+            <a:r>
+              <a:rPr lang="en-US" dirty="0" smtClean="0"/>
+              <a:t>Assertions: 29</a:t>
+            </a:r>
+          </a:p>
+          <a:p>
+            <a:endParaRPr lang="en-US" dirty="0"/>
+          </a:p>
+          <a:p>
             <a:endParaRPr lang="en-CA" dirty="0"/>
           </a:p>
         </p:txBody>
@@ -8301,7 +8718,7 @@
           <a:p>
             <a:r>
               <a:rPr lang="en-US" dirty="0" smtClean="0"/>
-              <a:t>Demonstrations</a:t>
+              <a:t>What did we learn?</a:t>
             </a:r>
             <a:endParaRPr lang="en-CA" dirty="0"/>
           </a:p>
@@ -8318,25 +8735,61 @@
           </p:nvPr>
         </p:nvSpPr>
         <p:spPr>
-          <a:noFill/>
+          <a:solidFill>
+            <a:srgbClr val="000000"/>
+          </a:solidFill>
           <a:ln>
-            <a:noFill/>
+            <a:solidFill>
+              <a:schemeClr val="accent1"/>
+            </a:solidFill>
           </a:ln>
         </p:spPr>
         <p:txBody>
-          <a:bodyPr>
-            <a:normAutofit lnSpcReduction="10000"/>
-          </a:bodyPr>
-          <a:lstStyle/>
-          <a:p>
-            <a:pPr algn="ctr">
-              <a:buNone/>
-            </a:pPr>
-            <a:r>
-              <a:rPr lang="en-US" sz="32000" dirty="0" smtClean="0"/>
-              <a:t>!</a:t>
-            </a:r>
-            <a:endParaRPr lang="en-CA" sz="32000" dirty="0" smtClean="0"/>
+          <a:bodyPr/>
+          <a:lstStyle/>
+          <a:p>
+            <a:r>
+              <a:rPr lang="en-US" dirty="0" smtClean="0"/>
+              <a:t>New methodology: </a:t>
+            </a:r>
+            <a:r>
+              <a:rPr lang="en-US" dirty="0" err="1" smtClean="0"/>
+              <a:t>Xtreme</a:t>
+            </a:r>
+            <a:r>
+              <a:rPr lang="en-US" dirty="0" smtClean="0"/>
+              <a:t> Programming</a:t>
+            </a:r>
+          </a:p>
+          <a:p>
+            <a:pPr lvl="1"/>
+            <a:r>
+              <a:rPr lang="en-US" dirty="0" smtClean="0"/>
+              <a:t>Pair programming</a:t>
+            </a:r>
+          </a:p>
+          <a:p>
+            <a:r>
+              <a:rPr lang="en-US" dirty="0" smtClean="0"/>
+              <a:t>New framework: Ruby on Rails</a:t>
+            </a:r>
+          </a:p>
+          <a:p>
+            <a:r>
+              <a:rPr lang="en-US" dirty="0" smtClean="0"/>
+              <a:t>New language: Ruby</a:t>
+            </a:r>
+          </a:p>
+          <a:p>
+            <a:r>
+              <a:rPr lang="en-US" dirty="0" smtClean="0"/>
+              <a:t>New versioning tool: </a:t>
+            </a:r>
+            <a:r>
+              <a:rPr lang="en-US" dirty="0" err="1" smtClean="0"/>
+              <a:t>Git</a:t>
+            </a:r>
+            <a:endParaRPr lang="en-US" dirty="0" smtClean="0"/>
           </a:p>
           <a:p>
             <a:endParaRPr lang="en-CA" dirty="0"/>
@@ -8352,6 +8805,201 @@
 </file>
 
 <file path=ppt/slides/slide25.xml><?xml version="1.0" encoding="utf-8"?>
+<p:sld xmlns:a="http://schemas.openxmlformats.org/drawingml/2006/main" xmlns:r="http://schemas.openxmlformats.org/officeDocument/2006/relationships" xmlns:p="http://schemas.openxmlformats.org/presentationml/2006/main">
+  <p:cSld>
+    <p:spTree>
+      <p:nvGrpSpPr>
+        <p:cNvPr id="1" name=""/>
+        <p:cNvGrpSpPr/>
+        <p:nvPr/>
+      </p:nvGrpSpPr>
+      <p:grpSpPr>
+        <a:xfrm>
+          <a:off x="0" y="0"/>
+          <a:ext cx="0" cy="0"/>
+          <a:chOff x="0" y="0"/>
+          <a:chExt cx="0" cy="0"/>
+        </a:xfrm>
+      </p:grpSpPr>
+      <p:sp>
+        <p:nvSpPr>
+          <p:cNvPr id="2" name="Title 1"/>
+          <p:cNvSpPr>
+            <a:spLocks noGrp="1"/>
+          </p:cNvSpPr>
+          <p:nvPr>
+            <p:ph type="title"/>
+          </p:nvPr>
+        </p:nvSpPr>
+        <p:spPr>
+          <a:solidFill>
+            <a:srgbClr val="000000"/>
+          </a:solidFill>
+          <a:ln>
+            <a:solidFill>
+              <a:schemeClr val="accent1"/>
+            </a:solidFill>
+          </a:ln>
+        </p:spPr>
+        <p:txBody>
+          <a:bodyPr/>
+          <a:lstStyle/>
+          <a:p>
+            <a:r>
+              <a:rPr lang="en-US" dirty="0" smtClean="0"/>
+              <a:t>Issues and Project Difficulties</a:t>
+            </a:r>
+            <a:endParaRPr lang="en-CA" dirty="0"/>
+          </a:p>
+        </p:txBody>
+      </p:sp>
+      <p:sp>
+        <p:nvSpPr>
+          <p:cNvPr id="3" name="Content Placeholder 2"/>
+          <p:cNvSpPr>
+            <a:spLocks noGrp="1"/>
+          </p:cNvSpPr>
+          <p:nvPr>
+            <p:ph idx="1"/>
+          </p:nvPr>
+        </p:nvSpPr>
+        <p:spPr>
+          <a:solidFill>
+            <a:srgbClr val="000000"/>
+          </a:solidFill>
+          <a:ln>
+            <a:solidFill>
+              <a:schemeClr val="accent1"/>
+            </a:solidFill>
+          </a:ln>
+        </p:spPr>
+        <p:txBody>
+          <a:bodyPr/>
+          <a:lstStyle/>
+          <a:p>
+            <a:r>
+              <a:rPr lang="en-US" dirty="0" smtClean="0"/>
+              <a:t>Needed additional time to learn new framework and language</a:t>
+            </a:r>
+          </a:p>
+          <a:p>
+            <a:r>
+              <a:rPr lang="en-US" dirty="0" smtClean="0"/>
+              <a:t>Difficulties contacting customers and getting user input</a:t>
+            </a:r>
+            <a:endParaRPr lang="en-US" dirty="0"/>
+          </a:p>
+          <a:p>
+            <a:r>
+              <a:rPr lang="en-US" dirty="0" smtClean="0"/>
+              <a:t>Technological difficulties: trouble communicating with telescope through Java programs</a:t>
+            </a:r>
+            <a:endParaRPr lang="en-CA" dirty="0"/>
+          </a:p>
+        </p:txBody>
+      </p:sp>
+    </p:spTree>
+  </p:cSld>
+  <p:clrMapOvr>
+    <a:masterClrMapping/>
+  </p:clrMapOvr>
+</p:sld>
+</file>
+
+<file path=ppt/slides/slide26.xml><?xml version="1.0" encoding="utf-8"?>
+<p:sld xmlns:a="http://schemas.openxmlformats.org/drawingml/2006/main" xmlns:r="http://schemas.openxmlformats.org/officeDocument/2006/relationships" xmlns:p="http://schemas.openxmlformats.org/presentationml/2006/main">
+  <p:cSld>
+    <p:spTree>
+      <p:nvGrpSpPr>
+        <p:cNvPr id="1" name=""/>
+        <p:cNvGrpSpPr/>
+        <p:nvPr/>
+      </p:nvGrpSpPr>
+      <p:grpSpPr>
+        <a:xfrm>
+          <a:off x="0" y="0"/>
+          <a:ext cx="0" cy="0"/>
+          <a:chOff x="0" y="0"/>
+          <a:chExt cx="0" cy="0"/>
+        </a:xfrm>
+      </p:grpSpPr>
+      <p:sp>
+        <p:nvSpPr>
+          <p:cNvPr id="2" name="Title 1"/>
+          <p:cNvSpPr>
+            <a:spLocks noGrp="1"/>
+          </p:cNvSpPr>
+          <p:nvPr>
+            <p:ph type="title"/>
+          </p:nvPr>
+        </p:nvSpPr>
+        <p:spPr>
+          <a:solidFill>
+            <a:srgbClr val="000000"/>
+          </a:solidFill>
+          <a:ln>
+            <a:solidFill>
+              <a:schemeClr val="accent1"/>
+            </a:solidFill>
+          </a:ln>
+        </p:spPr>
+        <p:txBody>
+          <a:bodyPr/>
+          <a:lstStyle/>
+          <a:p>
+            <a:r>
+              <a:rPr lang="en-US" dirty="0" smtClean="0"/>
+              <a:t>Demonstrations</a:t>
+            </a:r>
+            <a:endParaRPr lang="en-CA" dirty="0"/>
+          </a:p>
+        </p:txBody>
+      </p:sp>
+      <p:sp>
+        <p:nvSpPr>
+          <p:cNvPr id="3" name="Content Placeholder 2"/>
+          <p:cNvSpPr>
+            <a:spLocks noGrp="1"/>
+          </p:cNvSpPr>
+          <p:nvPr>
+            <p:ph idx="1"/>
+          </p:nvPr>
+        </p:nvSpPr>
+        <p:spPr>
+          <a:noFill/>
+          <a:ln>
+            <a:noFill/>
+          </a:ln>
+        </p:spPr>
+        <p:txBody>
+          <a:bodyPr>
+            <a:normAutofit lnSpcReduction="10000"/>
+          </a:bodyPr>
+          <a:lstStyle/>
+          <a:p>
+            <a:pPr algn="ctr">
+              <a:buNone/>
+            </a:pPr>
+            <a:r>
+              <a:rPr lang="en-US" sz="32000" dirty="0" smtClean="0"/>
+              <a:t>!</a:t>
+            </a:r>
+            <a:endParaRPr lang="en-CA" sz="32000" dirty="0" smtClean="0"/>
+          </a:p>
+          <a:p>
+            <a:endParaRPr lang="en-CA" dirty="0"/>
+          </a:p>
+        </p:txBody>
+      </p:sp>
+    </p:spTree>
+  </p:cSld>
+  <p:clrMapOvr>
+    <a:masterClrMapping/>
+  </p:clrMapOvr>
+</p:sld>
+</file>
+
+<file path=ppt/slides/slide27.xml><?xml version="1.0" encoding="utf-8"?>
 <p:sld xmlns:a="http://schemas.openxmlformats.org/drawingml/2006/main" xmlns:r="http://schemas.openxmlformats.org/officeDocument/2006/relationships" xmlns:p="http://schemas.openxmlformats.org/presentationml/2006/main">
   <p:cSld>
     <p:spTree>
@@ -8735,7 +9383,7 @@
           <a:p>
             <a:r>
               <a:rPr lang="en-US" dirty="0" smtClean="0"/>
-              <a:t>Astronomy is a hobby of theirs, so they own and operate several telescopes.</a:t>
+              <a:t>Astronomy is a hobby of theirs, so they own and operate over 10 telescopes.</a:t>
             </a:r>
           </a:p>
           <a:p>
@@ -8801,26 +9449,14 @@
               <a:schemeClr val="accent1"/>
             </a:solidFill>
           </a:ln>
-          <a:effectLst>
-            <a:glow rad="63500">
-              <a:schemeClr val="accent1">
-                <a:satMod val="175000"/>
-                <a:alpha val="40000"/>
-              </a:schemeClr>
-            </a:glow>
-          </a:effectLst>
         </p:spPr>
         <p:txBody>
           <a:bodyPr/>
           <a:lstStyle/>
           <a:p>
             <a:r>
-              <a:rPr lang="en-US" dirty="0" err="1" smtClean="0"/>
-              <a:t>Xtreme</a:t>
-            </a:r>
-            <a:r>
-              <a:rPr lang="en-US" dirty="0" smtClean="0"/>
-              <a:t> Programming</a:t>
+              <a:rPr lang="en-US" dirty="0" smtClean="0"/>
+              <a:t>Hardware Used</a:t>
             </a:r>
             <a:endParaRPr lang="en-CA" dirty="0"/>
           </a:p>
@@ -8837,10 +9473,6 @@
           </p:nvPr>
         </p:nvSpPr>
         <p:spPr>
-          <a:xfrm>
-            <a:off x="457200" y="1600201"/>
-            <a:ext cx="8229600" cy="4472006"/>
-          </a:xfrm>
           <a:solidFill>
             <a:srgbClr val="000000"/>
           </a:solidFill>
@@ -8849,100 +9481,37 @@
               <a:schemeClr val="accent1"/>
             </a:solidFill>
           </a:ln>
-          <a:effectLst>
-            <a:glow rad="63500">
-              <a:schemeClr val="accent1">
-                <a:satMod val="175000"/>
-                <a:alpha val="40000"/>
-              </a:schemeClr>
-            </a:glow>
-            <a:outerShdw blurRad="107950" dist="12700" dir="5400000" algn="ctr">
-              <a:srgbClr val="000000"/>
-            </a:outerShdw>
-          </a:effectLst>
         </p:spPr>
         <p:txBody>
-          <a:bodyPr>
-            <a:normAutofit fontScale="70000" lnSpcReduction="20000"/>
-          </a:bodyPr>
-          <a:lstStyle/>
-          <a:p>
-            <a:r>
-              <a:rPr lang="en-US" dirty="0" smtClean="0"/>
-              <a:t>Pair programming</a:t>
-            </a:r>
-          </a:p>
-          <a:p>
-            <a:r>
-              <a:rPr lang="en-US" dirty="0" smtClean="0"/>
-              <a:t>Test-driven development</a:t>
-            </a:r>
-          </a:p>
-          <a:p>
-            <a:r>
-              <a:rPr lang="en-US" dirty="0" smtClean="0"/>
-              <a:t>Whole team</a:t>
-            </a:r>
-          </a:p>
-          <a:p>
-            <a:r>
-              <a:rPr lang="en-US" dirty="0" smtClean="0"/>
-              <a:t>Customer tests</a:t>
-            </a:r>
-          </a:p>
-          <a:p>
-            <a:r>
-              <a:rPr lang="en-US" dirty="0" smtClean="0"/>
-              <a:t>Collective code ownership</a:t>
-            </a:r>
-          </a:p>
-          <a:p>
-            <a:r>
-              <a:rPr lang="en-US" dirty="0" smtClean="0"/>
-              <a:t>Sustainable pace</a:t>
-            </a:r>
-          </a:p>
-          <a:p>
-            <a:r>
-              <a:rPr lang="en-US" dirty="0" smtClean="0"/>
-              <a:t>Metaphor</a:t>
-            </a:r>
-          </a:p>
-          <a:p>
-            <a:r>
-              <a:rPr lang="en-US" dirty="0" smtClean="0"/>
-              <a:t>Simple design</a:t>
-            </a:r>
-          </a:p>
-          <a:p>
-            <a:r>
-              <a:rPr lang="en-US" dirty="0" smtClean="0"/>
-              <a:t>Design improvement</a:t>
-            </a:r>
-          </a:p>
-          <a:p>
-            <a:r>
-              <a:rPr lang="en-US" dirty="0" smtClean="0"/>
-              <a:t>Planning game</a:t>
-            </a:r>
-          </a:p>
-          <a:p>
-            <a:r>
-              <a:rPr lang="en-US" dirty="0" smtClean="0"/>
-              <a:t>Small releases</a:t>
-            </a:r>
-          </a:p>
-          <a:p>
-            <a:r>
-              <a:rPr lang="en-US" dirty="0" smtClean="0"/>
-              <a:t>Coding Standards</a:t>
-            </a:r>
-          </a:p>
-          <a:p>
-            <a:r>
-              <a:rPr lang="en-US" dirty="0" smtClean="0"/>
-              <a:t>Continuous integration</a:t>
-            </a:r>
+          <a:bodyPr/>
+          <a:lstStyle/>
+          <a:p>
+            <a:r>
+              <a:rPr lang="en-US" dirty="0" smtClean="0"/>
+              <a:t>Telescope: Meade LX200</a:t>
+            </a:r>
+          </a:p>
+          <a:p>
+            <a:r>
+              <a:rPr lang="en-US" dirty="0" smtClean="0"/>
+              <a:t>Digital camera: Sony A900 DSLR</a:t>
+            </a:r>
+          </a:p>
+          <a:p>
+            <a:r>
+              <a:rPr lang="en-US" dirty="0" smtClean="0"/>
+              <a:t>Mobile device: Nokia phones, Apple </a:t>
+            </a:r>
+            <a:r>
+              <a:rPr lang="en-US" dirty="0" err="1" smtClean="0"/>
+              <a:t>iPhone</a:t>
+            </a:r>
+            <a:endParaRPr lang="en-US" dirty="0" smtClean="0"/>
+          </a:p>
+          <a:p>
+            <a:endParaRPr lang="en-US" dirty="0" smtClean="0"/>
+          </a:p>
+          <a:p>
             <a:endParaRPr lang="en-CA" dirty="0"/>
           </a:p>
         </p:txBody>
@@ -9005,7 +9574,7 @@
           <a:p>
             <a:r>
               <a:rPr lang="en-US" dirty="0" smtClean="0"/>
-              <a:t>Hardware Used</a:t>
+              <a:t>Software Used</a:t>
             </a:r>
             <a:endParaRPr lang="en-CA" dirty="0"/>
           </a:p>
@@ -9037,27 +9606,54 @@
           <a:p>
             <a:r>
               <a:rPr lang="en-US" dirty="0" smtClean="0"/>
-              <a:t>Telescope: Meade LX200</a:t>
-            </a:r>
-          </a:p>
-          <a:p>
-            <a:r>
-              <a:rPr lang="en-US" dirty="0" smtClean="0"/>
-              <a:t>Digital camera: Sony A900 DSLR</a:t>
-            </a:r>
-          </a:p>
-          <a:p>
-            <a:r>
-              <a:rPr lang="en-US" dirty="0" smtClean="0"/>
-              <a:t>Mobile device: Nokia phones, Apple </a:t>
+              <a:t>Documentation: Microsoft Word</a:t>
+            </a:r>
+          </a:p>
+          <a:p>
+            <a:r>
+              <a:rPr lang="en-US" dirty="0" smtClean="0"/>
+              <a:t>Modeling: </a:t>
             </a:r>
             <a:r>
               <a:rPr lang="en-US" dirty="0" err="1" smtClean="0"/>
-              <a:t>iPhone</a:t>
+              <a:t>NetBeans</a:t>
+            </a:r>
+            <a:r>
+              <a:rPr lang="en-US" dirty="0" smtClean="0"/>
+              <a:t>, Rational Rose, </a:t>
+            </a:r>
+            <a:r>
+              <a:rPr lang="en-US" dirty="0" err="1" smtClean="0"/>
+              <a:t>RailRoad</a:t>
             </a:r>
             <a:endParaRPr lang="en-US" dirty="0" smtClean="0"/>
           </a:p>
           <a:p>
+            <a:r>
+              <a:rPr lang="en-US" dirty="0" smtClean="0"/>
+              <a:t>Text editors: E, </a:t>
+            </a:r>
+            <a:r>
+              <a:rPr lang="en-US" dirty="0" err="1" smtClean="0"/>
+              <a:t>gedit</a:t>
+            </a:r>
+            <a:r>
+              <a:rPr lang="en-US" dirty="0" smtClean="0"/>
+              <a:t>, vim</a:t>
+            </a:r>
+          </a:p>
+          <a:p>
+            <a:r>
+              <a:rPr lang="en-US" dirty="0" smtClean="0"/>
+              <a:t>Web browsers: Google Chrome, Mozilla Firefox</a:t>
+            </a:r>
+            <a:endParaRPr lang="en-US" dirty="0"/>
+          </a:p>
+          <a:p>
+            <a:endParaRPr lang="en-US" dirty="0" smtClean="0"/>
+          </a:p>
+          <a:p>
+            <a:pPr lvl="1"/>
             <a:endParaRPr lang="en-US" dirty="0" smtClean="0"/>
           </a:p>
           <a:p>
@@ -9123,7 +9719,7 @@
           <a:p>
             <a:r>
               <a:rPr lang="en-US" dirty="0" smtClean="0"/>
-              <a:t>Software Used</a:t>
+              <a:t>Customer’s Programs</a:t>
             </a:r>
             <a:endParaRPr lang="en-CA" dirty="0"/>
           </a:p>
@@ -9140,70 +9736,25 @@
           </p:nvPr>
         </p:nvSpPr>
         <p:spPr>
-          <a:solidFill>
-            <a:srgbClr val="000000"/>
-          </a:solidFill>
+          <a:noFill/>
           <a:ln>
-            <a:solidFill>
-              <a:schemeClr val="accent1"/>
-            </a:solidFill>
+            <a:noFill/>
           </a:ln>
         </p:spPr>
         <p:txBody>
-          <a:bodyPr/>
-          <a:lstStyle/>
-          <a:p>
-            <a:r>
-              <a:rPr lang="en-US" dirty="0" smtClean="0"/>
-              <a:t>Documentation: Microsoft Word</a:t>
-            </a:r>
-          </a:p>
-          <a:p>
-            <a:r>
-              <a:rPr lang="en-US" dirty="0" smtClean="0"/>
-              <a:t>Modeling: </a:t>
-            </a:r>
-            <a:r>
-              <a:rPr lang="en-US" dirty="0" err="1" smtClean="0"/>
-              <a:t>NetBeans</a:t>
-            </a:r>
-            <a:r>
-              <a:rPr lang="en-US" dirty="0" smtClean="0"/>
-              <a:t>, Rational Rose, </a:t>
-            </a:r>
-            <a:r>
-              <a:rPr lang="en-US" dirty="0" err="1" smtClean="0"/>
-              <a:t>RailRoad</a:t>
-            </a:r>
-            <a:endParaRPr lang="en-US" dirty="0" smtClean="0"/>
-          </a:p>
-          <a:p>
-            <a:r>
-              <a:rPr lang="en-US" dirty="0" smtClean="0"/>
-              <a:t>Text editors: E, </a:t>
-            </a:r>
-            <a:r>
-              <a:rPr lang="en-US" dirty="0" err="1" smtClean="0"/>
-              <a:t>gedit</a:t>
-            </a:r>
-            <a:r>
-              <a:rPr lang="en-US" dirty="0" smtClean="0"/>
-              <a:t>, vim</a:t>
-            </a:r>
-          </a:p>
-          <a:p>
-            <a:r>
-              <a:rPr lang="en-US" dirty="0" smtClean="0"/>
-              <a:t>Web browsers: Google Chrome, Mozilla Firefox</a:t>
-            </a:r>
-            <a:endParaRPr lang="en-US" dirty="0"/>
-          </a:p>
-          <a:p>
-            <a:endParaRPr lang="en-US" dirty="0" smtClean="0"/>
-          </a:p>
-          <a:p>
-            <a:pPr lvl="1"/>
-            <a:endParaRPr lang="en-US" dirty="0" smtClean="0"/>
+          <a:bodyPr>
+            <a:normAutofit lnSpcReduction="10000"/>
+          </a:bodyPr>
+          <a:lstStyle/>
+          <a:p>
+            <a:pPr algn="ctr">
+              <a:buNone/>
+            </a:pPr>
+            <a:r>
+              <a:rPr lang="en-US" sz="32000" dirty="0" smtClean="0"/>
+              <a:t>!</a:t>
+            </a:r>
+            <a:endParaRPr lang="en-CA" sz="32000" dirty="0" smtClean="0"/>
           </a:p>
           <a:p>
             <a:endParaRPr lang="en-CA" dirty="0"/>
@@ -9215,13 +9766,6 @@
   <p:clrMapOvr>
     <a:masterClrMapping/>
   </p:clrMapOvr>
-  <p:timing>
-    <p:tnLst>
-      <p:par>
-        <p:cTn id="1" dur="indefinite" restart="never" nodeType="tmRoot"/>
-      </p:par>
-    </p:tnLst>
-  </p:timing>
 </p:sld>
 </file>
 
@@ -9261,14 +9805,26 @@
               <a:schemeClr val="accent1"/>
             </a:solidFill>
           </a:ln>
+          <a:effectLst>
+            <a:glow rad="63500">
+              <a:schemeClr val="accent1">
+                <a:satMod val="175000"/>
+                <a:alpha val="40000"/>
+              </a:schemeClr>
+            </a:glow>
+          </a:effectLst>
         </p:spPr>
         <p:txBody>
           <a:bodyPr/>
           <a:lstStyle/>
           <a:p>
             <a:r>
-              <a:rPr lang="en-US" dirty="0" smtClean="0"/>
-              <a:t>Web Application Components</a:t>
+              <a:rPr lang="en-US" dirty="0" err="1" smtClean="0"/>
+              <a:t>Xtreme</a:t>
+            </a:r>
+            <a:r>
+              <a:rPr lang="en-US" dirty="0" smtClean="0"/>
+              <a:t> Programming</a:t>
             </a:r>
             <a:endParaRPr lang="en-CA" dirty="0"/>
           </a:p>
@@ -9285,6 +9841,10 @@
           </p:nvPr>
         </p:nvSpPr>
         <p:spPr>
+          <a:xfrm>
+            <a:off x="457200" y="1600201"/>
+            <a:ext cx="8229600" cy="4472006"/>
+          </a:xfrm>
           <a:solidFill>
             <a:srgbClr val="000000"/>
           </a:solidFill>
@@ -9293,50 +9853,99 @@
               <a:schemeClr val="accent1"/>
             </a:solidFill>
           </a:ln>
+          <a:effectLst>
+            <a:glow rad="63500">
+              <a:schemeClr val="accent1">
+                <a:satMod val="175000"/>
+                <a:alpha val="40000"/>
+              </a:schemeClr>
+            </a:glow>
+            <a:outerShdw blurRad="107950" dist="12700" dir="5400000" algn="ctr">
+              <a:srgbClr val="000000"/>
+            </a:outerShdw>
+          </a:effectLst>
         </p:spPr>
         <p:txBody>
           <a:bodyPr>
-            <a:normAutofit/>
+            <a:normAutofit fontScale="70000" lnSpcReduction="20000"/>
           </a:bodyPr>
           <a:lstStyle/>
           <a:p>
             <a:r>
               <a:rPr lang="en-US" dirty="0" smtClean="0"/>
-              <a:t>Framework: Ruby on Rails</a:t>
-            </a:r>
-          </a:p>
-          <a:p>
-            <a:r>
-              <a:rPr lang="en-US" dirty="0" smtClean="0"/>
-              <a:t>Language: Ruby</a:t>
-            </a:r>
-          </a:p>
-          <a:p>
-            <a:r>
-              <a:rPr lang="en-US" dirty="0" smtClean="0"/>
-              <a:t>Presentation: CSS</a:t>
-            </a:r>
-          </a:p>
-          <a:p>
-            <a:r>
-              <a:rPr lang="en-US" dirty="0" smtClean="0"/>
-              <a:t>Operating System: Fedora 11</a:t>
-            </a:r>
-          </a:p>
-          <a:p>
-            <a:r>
-              <a:rPr lang="en-US" dirty="0" smtClean="0"/>
-              <a:t>Web Server: Apache2 (Mongrel for development)</a:t>
-            </a:r>
-          </a:p>
-          <a:p>
-            <a:r>
-              <a:rPr lang="en-US" dirty="0" smtClean="0"/>
-              <a:t>Database: </a:t>
-            </a:r>
-            <a:r>
-              <a:rPr lang="en-US" dirty="0" err="1" smtClean="0"/>
-              <a:t>SQLite</a:t>
+              <a:t>Pair programming</a:t>
+            </a:r>
+          </a:p>
+          <a:p>
+            <a:r>
+              <a:rPr lang="en-US" dirty="0" smtClean="0"/>
+              <a:t>Test-driven development</a:t>
+            </a:r>
+          </a:p>
+          <a:p>
+            <a:r>
+              <a:rPr lang="en-US" dirty="0" smtClean="0"/>
+              <a:t>Whole team</a:t>
+            </a:r>
+          </a:p>
+          <a:p>
+            <a:r>
+              <a:rPr lang="en-US" dirty="0" smtClean="0"/>
+              <a:t>Customer tests</a:t>
+            </a:r>
+          </a:p>
+          <a:p>
+            <a:r>
+              <a:rPr lang="en-US" dirty="0" smtClean="0"/>
+              <a:t>Collective code ownership</a:t>
+            </a:r>
+          </a:p>
+          <a:p>
+            <a:r>
+              <a:rPr lang="en-US" dirty="0" smtClean="0"/>
+              <a:t>Sustainable pace</a:t>
+            </a:r>
+          </a:p>
+          <a:p>
+            <a:r>
+              <a:rPr lang="en-US" dirty="0" smtClean="0"/>
+              <a:t>Metaphor</a:t>
+            </a:r>
+          </a:p>
+          <a:p>
+            <a:r>
+              <a:rPr lang="en-US" dirty="0" smtClean="0"/>
+              <a:t>Simple design</a:t>
+            </a:r>
+          </a:p>
+          <a:p>
+            <a:r>
+              <a:rPr lang="en-US" dirty="0" smtClean="0"/>
+              <a:t>Design improvement</a:t>
+            </a:r>
+          </a:p>
+          <a:p>
+            <a:r>
+              <a:rPr lang="en-US" dirty="0" smtClean="0"/>
+              <a:t>Planning game</a:t>
+            </a:r>
+          </a:p>
+          <a:p>
+            <a:r>
+              <a:rPr lang="en-US" dirty="0" smtClean="0"/>
+              <a:t>Small releases</a:t>
+            </a:r>
+          </a:p>
+          <a:p>
+            <a:r>
+              <a:rPr lang="en-US" dirty="0" smtClean="0"/>
+              <a:t>Coding Standards</a:t>
+            </a:r>
+          </a:p>
+          <a:p>
+            <a:r>
+              <a:rPr lang="en-US" dirty="0" smtClean="0"/>
+              <a:t>Continuous integration</a:t>
             </a:r>
             <a:endParaRPr lang="en-CA" dirty="0"/>
           </a:p>
@@ -9347,6 +9956,13 @@
   <p:clrMapOvr>
     <a:masterClrMapping/>
   </p:clrMapOvr>
+  <p:timing>
+    <p:tnLst>
+      <p:par>
+        <p:cTn id="1" dur="indefinite" restart="never" nodeType="tmRoot"/>
+      </p:par>
+    </p:tnLst>
+  </p:timing>
 </p:sld>
 </file>
 

</xml_diff>

<commit_message>
added final release notes
</commit_message>
<xml_diff>
--- a/Stargazer.pptx
+++ b/Stargazer.pptx
@@ -219,7 +219,7 @@
             <a:fld id="{2AAFEF68-1DE9-47A7-9FE3-8BA9D24E7EE3}" type="datetimeFigureOut">
               <a:rPr lang="en-US" smtClean="0"/>
               <a:pPr/>
-              <a:t>12/3/2009</a:t>
+              <a:t>12/4/2009</a:t>
             </a:fld>
             <a:endParaRPr lang="en-CA"/>
           </a:p>
@@ -589,15 +589,7 @@
             </a:r>
             <a:r>
               <a:rPr lang="en-US" baseline="0" dirty="0" smtClean="0"/>
-              <a:t> have no restrictions and can manage users (add, edit, update), and can make changes to any schedule. Regular users can only add new schedules as well as edit and update their own schedules. They are also able to view other schedules, but not </a:t>
-            </a:r>
-            <a:r>
-              <a:rPr lang="en-US" baseline="0" dirty="0" smtClean="0"/>
-              <a:t>make any </a:t>
-            </a:r>
-            <a:r>
-              <a:rPr lang="en-US" baseline="0" dirty="0" smtClean="0"/>
-              <a:t>changes to them, and edit their own profile (change username, password, email).</a:t>
+              <a:t> have no restrictions and can manage users (add, edit, update), and can make changes to any schedule. Regular users can only add new schedules as well as edit and update their own schedules. They are also able to view other schedules, but not make any changes to them, and edit their own profile (change username, password, email).</a:t>
             </a:r>
           </a:p>
           <a:p>
@@ -2828,6 +2820,18 @@
           </a:bodyPr>
           <a:lstStyle/>
           <a:p>
+            <a:r>
+              <a:rPr lang="en-CA" dirty="0" smtClean="0"/>
+              <a:t>Demo the</a:t>
+            </a:r>
+            <a:r>
+              <a:rPr lang="en-CA" baseline="0" dirty="0" smtClean="0"/>
+              <a:t> </a:t>
+            </a:r>
+            <a:r>
+              <a:rPr lang="en-CA" baseline="0" smtClean="0"/>
+              <a:t>DVONN game.</a:t>
+            </a:r>
             <a:endParaRPr lang="en-CA" dirty="0"/>
           </a:p>
         </p:txBody>
@@ -3251,19 +3255,7 @@
           <a:p>
             <a:r>
               <a:rPr lang="en-US" dirty="0" smtClean="0"/>
-              <a:t>The Rails philosophy </a:t>
-            </a:r>
-            <a:r>
-              <a:rPr lang="en-US" dirty="0" smtClean="0"/>
-              <a:t>also includes </a:t>
-            </a:r>
-            <a:r>
-              <a:rPr lang="en-US" dirty="0" smtClean="0"/>
-              <a:t>several guiding </a:t>
-            </a:r>
-            <a:r>
-              <a:rPr lang="en-US" dirty="0" smtClean="0"/>
-              <a:t>principles such as:</a:t>
+              <a:t>The Rails philosophy also includes several guiding principles such as:</a:t>
             </a:r>
           </a:p>
           <a:p>
@@ -3290,17 +3282,8 @@
           <a:p>
             <a:r>
               <a:rPr lang="en-US" dirty="0" smtClean="0"/>
-              <a:t>Convention </a:t>
-            </a:r>
-            <a:r>
-              <a:rPr lang="en-US" dirty="0" smtClean="0"/>
-              <a:t>Over Configuration – means that Rails makes assumptions about what you want to do and how you’re going to do it, rather than letting you tweak every little thing through endless configuration </a:t>
-            </a:r>
-            <a:r>
-              <a:rPr lang="en-US" dirty="0" smtClean="0"/>
-              <a:t>files which eliminates a lot of redundancy and allows for greater productivity.</a:t>
-            </a:r>
-            <a:endParaRPr lang="en-US" dirty="0" smtClean="0"/>
+              <a:t>Convention Over Configuration – means that Rails makes assumptions about what you want to do and how you’re going to do it, rather than letting you tweak every little thing through endless configuration files which eliminates a lot of redundancy and allows for greater productivity.</a:t>
+            </a:r>
           </a:p>
           <a:p>
             <a:endParaRPr lang="en-US" dirty="0"/>
@@ -3521,7 +3504,7 @@
             <a:fld id="{471E1C79-A119-44DE-84CD-391F73B5F415}" type="datetimeFigureOut">
               <a:rPr lang="en-US" smtClean="0"/>
               <a:pPr/>
-              <a:t>12/3/2009</a:t>
+              <a:t>12/4/2009</a:t>
             </a:fld>
             <a:endParaRPr lang="en-CA"/>
           </a:p>
@@ -3688,7 +3671,7 @@
             <a:fld id="{471E1C79-A119-44DE-84CD-391F73B5F415}" type="datetimeFigureOut">
               <a:rPr lang="en-US" smtClean="0"/>
               <a:pPr/>
-              <a:t>12/3/2009</a:t>
+              <a:t>12/4/2009</a:t>
             </a:fld>
             <a:endParaRPr lang="en-CA"/>
           </a:p>
@@ -3865,7 +3848,7 @@
             <a:fld id="{471E1C79-A119-44DE-84CD-391F73B5F415}" type="datetimeFigureOut">
               <a:rPr lang="en-US" smtClean="0"/>
               <a:pPr/>
-              <a:t>12/3/2009</a:t>
+              <a:t>12/4/2009</a:t>
             </a:fld>
             <a:endParaRPr lang="en-CA"/>
           </a:p>
@@ -4032,7 +4015,7 @@
             <a:fld id="{471E1C79-A119-44DE-84CD-391F73B5F415}" type="datetimeFigureOut">
               <a:rPr lang="en-US" smtClean="0"/>
               <a:pPr/>
-              <a:t>12/3/2009</a:t>
+              <a:t>12/4/2009</a:t>
             </a:fld>
             <a:endParaRPr lang="en-CA"/>
           </a:p>
@@ -4275,7 +4258,7 @@
             <a:fld id="{471E1C79-A119-44DE-84CD-391F73B5F415}" type="datetimeFigureOut">
               <a:rPr lang="en-US" smtClean="0"/>
               <a:pPr/>
-              <a:t>12/3/2009</a:t>
+              <a:t>12/4/2009</a:t>
             </a:fld>
             <a:endParaRPr lang="en-CA"/>
           </a:p>
@@ -4560,7 +4543,7 @@
             <a:fld id="{471E1C79-A119-44DE-84CD-391F73B5F415}" type="datetimeFigureOut">
               <a:rPr lang="en-US" smtClean="0"/>
               <a:pPr/>
-              <a:t>12/3/2009</a:t>
+              <a:t>12/4/2009</a:t>
             </a:fld>
             <a:endParaRPr lang="en-CA"/>
           </a:p>
@@ -4979,7 +4962,7 @@
             <a:fld id="{471E1C79-A119-44DE-84CD-391F73B5F415}" type="datetimeFigureOut">
               <a:rPr lang="en-US" smtClean="0"/>
               <a:pPr/>
-              <a:t>12/3/2009</a:t>
+              <a:t>12/4/2009</a:t>
             </a:fld>
             <a:endParaRPr lang="en-CA"/>
           </a:p>
@@ -5094,7 +5077,7 @@
             <a:fld id="{471E1C79-A119-44DE-84CD-391F73B5F415}" type="datetimeFigureOut">
               <a:rPr lang="en-US" smtClean="0"/>
               <a:pPr/>
-              <a:t>12/3/2009</a:t>
+              <a:t>12/4/2009</a:t>
             </a:fld>
             <a:endParaRPr lang="en-CA"/>
           </a:p>
@@ -5186,7 +5169,7 @@
             <a:fld id="{471E1C79-A119-44DE-84CD-391F73B5F415}" type="datetimeFigureOut">
               <a:rPr lang="en-US" smtClean="0"/>
               <a:pPr/>
-              <a:t>12/3/2009</a:t>
+              <a:t>12/4/2009</a:t>
             </a:fld>
             <a:endParaRPr lang="en-CA"/>
           </a:p>
@@ -5460,7 +5443,7 @@
             <a:fld id="{471E1C79-A119-44DE-84CD-391F73B5F415}" type="datetimeFigureOut">
               <a:rPr lang="en-US" smtClean="0"/>
               <a:pPr/>
-              <a:t>12/3/2009</a:t>
+              <a:t>12/4/2009</a:t>
             </a:fld>
             <a:endParaRPr lang="en-CA"/>
           </a:p>
@@ -5710,7 +5693,7 @@
             <a:fld id="{471E1C79-A119-44DE-84CD-391F73B5F415}" type="datetimeFigureOut">
               <a:rPr lang="en-US" smtClean="0"/>
               <a:pPr/>
-              <a:t>12/3/2009</a:t>
+              <a:t>12/4/2009</a:t>
             </a:fld>
             <a:endParaRPr lang="en-CA"/>
           </a:p>
@@ -5929,7 +5912,7 @@
             <a:fld id="{471E1C79-A119-44DE-84CD-391F73B5F415}" type="datetimeFigureOut">
               <a:rPr lang="en-US" smtClean="0"/>
               <a:pPr/>
-              <a:t>12/3/2009</a:t>
+              <a:t>12/4/2009</a:t>
             </a:fld>
             <a:endParaRPr lang="en-CA"/>
           </a:p>
@@ -6564,7 +6547,15 @@
           <a:p>
             <a:r>
               <a:rPr lang="en-US" dirty="0" smtClean="0"/>
-              <a:t>In order to learn the fundamentals of XP, we had a 6.5 week SPIKE project whose goal is to emulate a board game called DVONN.</a:t>
+              <a:t>In order to learn the fundamentals of XP, we had a </a:t>
+            </a:r>
+            <a:r>
+              <a:rPr lang="en-US" dirty="0" smtClean="0"/>
+              <a:t>6 </a:t>
+            </a:r>
+            <a:r>
+              <a:rPr lang="en-US" dirty="0" smtClean="0"/>
+              <a:t>week SPIKE project whose goal is to emulate a board game called DVONN.</a:t>
             </a:r>
           </a:p>
           <a:p>
@@ -6805,11 +6796,7 @@
           <a:p>
             <a:r>
               <a:rPr lang="en-US" dirty="0" smtClean="0"/>
-              <a:t>Framework </a:t>
-            </a:r>
-            <a:r>
-              <a:rPr lang="en-US" dirty="0" smtClean="0"/>
-              <a:t>for generating web applications quickly.</a:t>
+              <a:t>Framework for generating web applications quickly.</a:t>
             </a:r>
             <a:endParaRPr lang="en-US" dirty="0"/>
           </a:p>
@@ -6829,13 +6816,8 @@
           <a:p>
             <a:r>
               <a:rPr lang="en-US" dirty="0" smtClean="0"/>
-              <a:t>“DRY” code</a:t>
-            </a:r>
-            <a:r>
-              <a:rPr lang="en-US" dirty="0" smtClean="0"/>
-              <a:t>.</a:t>
-            </a:r>
-            <a:endParaRPr lang="en-US" dirty="0" smtClean="0"/>
+              <a:t>“DRY” code.</a:t>
+            </a:r>
           </a:p>
           <a:p>
             <a:r>
@@ -6844,15 +6826,7 @@
             </a:r>
             <a:r>
               <a:rPr lang="en-US" dirty="0" smtClean="0"/>
-              <a:t> </a:t>
-            </a:r>
-            <a:r>
-              <a:rPr lang="en-US" dirty="0" smtClean="0"/>
-              <a:t>architecture</a:t>
-            </a:r>
-            <a:r>
-              <a:rPr lang="en-US" dirty="0" smtClean="0"/>
-              <a:t>.</a:t>
+              <a:t> architecture.</a:t>
             </a:r>
           </a:p>
           <a:p>
@@ -6972,7 +6946,6 @@
               <a:rPr lang="en-US" dirty="0" smtClean="0"/>
               <a:t>Small</a:t>
             </a:r>
-            <a:endParaRPr lang="en-US" dirty="0" smtClean="0"/>
           </a:p>
           <a:p>
             <a:pPr lvl="2"/>
@@ -10074,13 +10047,8 @@
           <a:p>
             <a:r>
               <a:rPr lang="en-US" dirty="0" smtClean="0"/>
-              <a:t>Total time: </a:t>
-            </a:r>
-            <a:r>
-              <a:rPr lang="en-US" dirty="0" smtClean="0"/>
-              <a:t> 438 units</a:t>
-            </a:r>
-            <a:endParaRPr lang="en-US" dirty="0" smtClean="0"/>
+              <a:t>Total time:  438 units</a:t>
+            </a:r>
           </a:p>
           <a:p>
             <a:endParaRPr lang="en-US" dirty="0"/>
@@ -10768,11 +10736,7 @@
           <a:p>
             <a:r>
               <a:rPr lang="en-US" dirty="0" smtClean="0"/>
-              <a:t>Online </a:t>
-            </a:r>
-            <a:r>
-              <a:rPr lang="en-US" dirty="0" smtClean="0"/>
-              <a:t>help</a:t>
+              <a:t>Online help</a:t>
             </a:r>
           </a:p>
           <a:p>

</xml_diff>

<commit_message>
Added draft for plan for second semester
</commit_message>
<xml_diff>
--- a/Stargazer.pptx
+++ b/Stargazer.pptx
@@ -219,7 +219,7 @@
             <a:fld id="{2AAFEF68-1DE9-47A7-9FE3-8BA9D24E7EE3}" type="datetimeFigureOut">
               <a:rPr lang="en-US" smtClean="0"/>
               <a:pPr/>
-              <a:t>12/4/2009</a:t>
+              <a:t>12/5/2009</a:t>
             </a:fld>
             <a:endParaRPr lang="en-CA"/>
           </a:p>
@@ -3504,7 +3504,7 @@
             <a:fld id="{471E1C79-A119-44DE-84CD-391F73B5F415}" type="datetimeFigureOut">
               <a:rPr lang="en-US" smtClean="0"/>
               <a:pPr/>
-              <a:t>12/4/2009</a:t>
+              <a:t>12/5/2009</a:t>
             </a:fld>
             <a:endParaRPr lang="en-CA"/>
           </a:p>
@@ -3671,7 +3671,7 @@
             <a:fld id="{471E1C79-A119-44DE-84CD-391F73B5F415}" type="datetimeFigureOut">
               <a:rPr lang="en-US" smtClean="0"/>
               <a:pPr/>
-              <a:t>12/4/2009</a:t>
+              <a:t>12/5/2009</a:t>
             </a:fld>
             <a:endParaRPr lang="en-CA"/>
           </a:p>
@@ -3848,7 +3848,7 @@
             <a:fld id="{471E1C79-A119-44DE-84CD-391F73B5F415}" type="datetimeFigureOut">
               <a:rPr lang="en-US" smtClean="0"/>
               <a:pPr/>
-              <a:t>12/4/2009</a:t>
+              <a:t>12/5/2009</a:t>
             </a:fld>
             <a:endParaRPr lang="en-CA"/>
           </a:p>
@@ -4015,7 +4015,7 @@
             <a:fld id="{471E1C79-A119-44DE-84CD-391F73B5F415}" type="datetimeFigureOut">
               <a:rPr lang="en-US" smtClean="0"/>
               <a:pPr/>
-              <a:t>12/4/2009</a:t>
+              <a:t>12/5/2009</a:t>
             </a:fld>
             <a:endParaRPr lang="en-CA"/>
           </a:p>
@@ -4258,7 +4258,7 @@
             <a:fld id="{471E1C79-A119-44DE-84CD-391F73B5F415}" type="datetimeFigureOut">
               <a:rPr lang="en-US" smtClean="0"/>
               <a:pPr/>
-              <a:t>12/4/2009</a:t>
+              <a:t>12/5/2009</a:t>
             </a:fld>
             <a:endParaRPr lang="en-CA"/>
           </a:p>
@@ -4543,7 +4543,7 @@
             <a:fld id="{471E1C79-A119-44DE-84CD-391F73B5F415}" type="datetimeFigureOut">
               <a:rPr lang="en-US" smtClean="0"/>
               <a:pPr/>
-              <a:t>12/4/2009</a:t>
+              <a:t>12/5/2009</a:t>
             </a:fld>
             <a:endParaRPr lang="en-CA"/>
           </a:p>
@@ -4962,7 +4962,7 @@
             <a:fld id="{471E1C79-A119-44DE-84CD-391F73B5F415}" type="datetimeFigureOut">
               <a:rPr lang="en-US" smtClean="0"/>
               <a:pPr/>
-              <a:t>12/4/2009</a:t>
+              <a:t>12/5/2009</a:t>
             </a:fld>
             <a:endParaRPr lang="en-CA"/>
           </a:p>
@@ -5077,7 +5077,7 @@
             <a:fld id="{471E1C79-A119-44DE-84CD-391F73B5F415}" type="datetimeFigureOut">
               <a:rPr lang="en-US" smtClean="0"/>
               <a:pPr/>
-              <a:t>12/4/2009</a:t>
+              <a:t>12/5/2009</a:t>
             </a:fld>
             <a:endParaRPr lang="en-CA"/>
           </a:p>
@@ -5169,7 +5169,7 @@
             <a:fld id="{471E1C79-A119-44DE-84CD-391F73B5F415}" type="datetimeFigureOut">
               <a:rPr lang="en-US" smtClean="0"/>
               <a:pPr/>
-              <a:t>12/4/2009</a:t>
+              <a:t>12/5/2009</a:t>
             </a:fld>
             <a:endParaRPr lang="en-CA"/>
           </a:p>
@@ -5443,7 +5443,7 @@
             <a:fld id="{471E1C79-A119-44DE-84CD-391F73B5F415}" type="datetimeFigureOut">
               <a:rPr lang="en-US" smtClean="0"/>
               <a:pPr/>
-              <a:t>12/4/2009</a:t>
+              <a:t>12/5/2009</a:t>
             </a:fld>
             <a:endParaRPr lang="en-CA"/>
           </a:p>
@@ -5693,7 +5693,7 @@
             <a:fld id="{471E1C79-A119-44DE-84CD-391F73B5F415}" type="datetimeFigureOut">
               <a:rPr lang="en-US" smtClean="0"/>
               <a:pPr/>
-              <a:t>12/4/2009</a:t>
+              <a:t>12/5/2009</a:t>
             </a:fld>
             <a:endParaRPr lang="en-CA"/>
           </a:p>
@@ -5912,7 +5912,7 @@
             <a:fld id="{471E1C79-A119-44DE-84CD-391F73B5F415}" type="datetimeFigureOut">
               <a:rPr lang="en-US" smtClean="0"/>
               <a:pPr/>
-              <a:t>12/4/2009</a:t>
+              <a:t>12/5/2009</a:t>
             </a:fld>
             <a:endParaRPr lang="en-CA"/>
           </a:p>
@@ -6547,15 +6547,7 @@
           <a:p>
             <a:r>
               <a:rPr lang="en-US" dirty="0" smtClean="0"/>
-              <a:t>In order to learn the fundamentals of XP, we had a </a:t>
-            </a:r>
-            <a:r>
-              <a:rPr lang="en-US" dirty="0" smtClean="0"/>
-              <a:t>6 </a:t>
-            </a:r>
-            <a:r>
-              <a:rPr lang="en-US" dirty="0" smtClean="0"/>
-              <a:t>week SPIKE project whose goal is to emulate a board game called DVONN.</a:t>
+              <a:t>In order to learn the fundamentals of XP, we had a 6 week SPIKE project whose goal is to emulate a board game called DVONN.</a:t>
             </a:r>
           </a:p>
           <a:p>
@@ -7685,8 +7677,12 @@
           <a:p>
             <a:pPr lvl="1"/>
             <a:r>
-              <a:rPr lang="en-US" dirty="0" smtClean="0"/>
-              <a:t>“Black box” tests to ensure functionality correctness. A test suite is used to run all unit tests whenever new code is added to the system</a:t>
+              <a:rPr lang="en-US" smtClean="0"/>
+              <a:t>“White box</a:t>
+            </a:r>
+            <a:r>
+              <a:rPr lang="en-US" dirty="0" smtClean="0"/>
+              <a:t>” tests to ensure functionality correctness. A test suite is used to run all unit tests whenever new code is added to the system</a:t>
             </a:r>
           </a:p>
           <a:p>

</xml_diff>